<commit_message>
Update 20WiSe-GPM LightingSharks TND v0.1.pptx
</commit_message>
<xml_diff>
--- a/20-11-23_Statusbericht/20WiSe-GPM LightingSharks TND v0.1.pptx
+++ b/20-11-23_Statusbericht/20WiSe-GPM LightingSharks TND v0.1.pptx
@@ -5,10 +5,10 @@
     <p:sldMasterId id="2147483648" r:id="rId1"/>
   </p:sldMasterIdLst>
   <p:notesMasterIdLst>
-    <p:notesMasterId r:id="rId10"/>
+    <p:notesMasterId r:id="rId11"/>
   </p:notesMasterIdLst>
   <p:handoutMasterIdLst>
-    <p:handoutMasterId r:id="rId11"/>
+    <p:handoutMasterId r:id="rId12"/>
   </p:handoutMasterIdLst>
   <p:sldIdLst>
     <p:sldId id="256" r:id="rId2"/>
@@ -19,6 +19,7 @@
     <p:sldId id="260" r:id="rId7"/>
     <p:sldId id="263" r:id="rId8"/>
     <p:sldId id="264" r:id="rId9"/>
+    <p:sldId id="265" r:id="rId10"/>
   </p:sldIdLst>
   <p:sldSz cx="12192000" cy="6858000"/>
   <p:notesSz cx="6858000" cy="9144000"/>
@@ -222,7 +223,7 @@
           <a:p>
             <a:fld id="{CDA2C67B-C551-4114-BB4B-773035E1BCF9}" type="datetimeFigureOut">
               <a:rPr lang="de-DE" smtClean="0"/>
-              <a:t>20.11.2020</a:t>
+              <a:t>23.11.2020</a:t>
             </a:fld>
             <a:endParaRPr lang="de-DE"/>
           </a:p>
@@ -406,7 +407,7 @@
           <a:p>
             <a:fld id="{B1969C9A-FA26-4BE3-A5C2-2CB944E849DF}" type="datetimeFigureOut">
               <a:rPr lang="de-DE" smtClean="0"/>
-              <a:t>20.11.2020</a:t>
+              <a:t>23.11.2020</a:t>
             </a:fld>
             <a:endParaRPr lang="de-DE"/>
           </a:p>
@@ -830,7 +831,7 @@
             <a:fld id="{BD6664B8-6F99-46E9-88D7-590A7272AC83}" type="datetime1">
               <a:rPr lang="de-DE" smtClean="0"/>
               <a:pPr/>
-              <a:t>20.11.2020</a:t>
+              <a:t>23.11.2020</a:t>
             </a:fld>
             <a:endParaRPr lang="de-DE" dirty="0"/>
           </a:p>
@@ -1348,7 +1349,7 @@
           <a:p>
             <a:fld id="{56EED089-B761-4547-B622-BA15B219B347}" type="datetime1">
               <a:rPr lang="de-DE" smtClean="0"/>
-              <a:t>20.11.2020</a:t>
+              <a:t>23.11.2020</a:t>
             </a:fld>
             <a:endParaRPr lang="de-DE"/>
           </a:p>
@@ -1559,7 +1560,7 @@
           <a:p>
             <a:fld id="{182F02A4-668E-4288-B43D-8977D67783D7}" type="datetime1">
               <a:rPr lang="de-DE" smtClean="0"/>
-              <a:t>20.11.2020</a:t>
+              <a:t>23.11.2020</a:t>
             </a:fld>
             <a:endParaRPr lang="de-DE"/>
           </a:p>
@@ -1760,7 +1761,7 @@
           <a:p>
             <a:fld id="{D051D121-2F98-4E5C-8353-0F3074D17C46}" type="datetime1">
               <a:rPr lang="de-DE" smtClean="0"/>
-              <a:t>20.11.2020</a:t>
+              <a:t>23.11.2020</a:t>
             </a:fld>
             <a:endParaRPr lang="de-DE"/>
           </a:p>
@@ -2038,7 +2039,7 @@
           <a:p>
             <a:fld id="{652FC317-3B8C-432F-9B25-139581C86B12}" type="datetime1">
               <a:rPr lang="de-DE" smtClean="0"/>
-              <a:t>20.11.2020</a:t>
+              <a:t>23.11.2020</a:t>
             </a:fld>
             <a:endParaRPr lang="de-DE"/>
           </a:p>
@@ -2306,7 +2307,7 @@
           <a:p>
             <a:fld id="{B8E74307-AA0E-44AC-B65A-4A796D65F1A1}" type="datetime1">
               <a:rPr lang="de-DE" smtClean="0"/>
-              <a:t>20.11.2020</a:t>
+              <a:t>23.11.2020</a:t>
             </a:fld>
             <a:endParaRPr lang="de-DE"/>
           </a:p>
@@ -2721,7 +2722,7 @@
           <a:p>
             <a:fld id="{DACEB6CE-C667-4ED1-9A61-4940F98BD9A2}" type="datetime1">
               <a:rPr lang="de-DE" smtClean="0"/>
-              <a:t>20.11.2020</a:t>
+              <a:t>23.11.2020</a:t>
             </a:fld>
             <a:endParaRPr lang="de-DE"/>
           </a:p>
@@ -2865,7 +2866,7 @@
           <a:p>
             <a:fld id="{72291ADE-AD19-4653-A0D4-D19A59F68538}" type="datetime1">
               <a:rPr lang="de-DE" smtClean="0"/>
-              <a:t>20.11.2020</a:t>
+              <a:t>23.11.2020</a:t>
             </a:fld>
             <a:endParaRPr lang="de-DE"/>
           </a:p>
@@ -2981,7 +2982,7 @@
           <a:p>
             <a:fld id="{10D2ED8B-448F-462B-9AC8-951B495911B8}" type="datetime1">
               <a:rPr lang="de-DE" smtClean="0"/>
-              <a:t>20.11.2020</a:t>
+              <a:t>23.11.2020</a:t>
             </a:fld>
             <a:endParaRPr lang="de-DE"/>
           </a:p>
@@ -3295,7 +3296,7 @@
           <a:p>
             <a:fld id="{5A557F32-CB30-4338-9D48-7407960BC3CC}" type="datetime1">
               <a:rPr lang="de-DE" smtClean="0"/>
-              <a:t>20.11.2020</a:t>
+              <a:t>23.11.2020</a:t>
             </a:fld>
             <a:endParaRPr lang="de-DE"/>
           </a:p>
@@ -3586,7 +3587,7 @@
           <a:p>
             <a:fld id="{61C29A9E-3746-48C4-B3CF-93C6CEC81786}" type="datetime1">
               <a:rPr lang="de-DE" smtClean="0"/>
-              <a:t>20.11.2020</a:t>
+              <a:t>23.11.2020</a:t>
             </a:fld>
             <a:endParaRPr lang="de-DE"/>
           </a:p>
@@ -3830,7 +3831,7 @@
           <a:p>
             <a:fld id="{9C456670-8FD0-4272-9F82-6FD399EDD91A}" type="datetime1">
               <a:rPr lang="de-DE" smtClean="0"/>
-              <a:t>20.11.2020</a:t>
+              <a:t>23.11.2020</a:t>
             </a:fld>
             <a:endParaRPr lang="de-DE"/>
           </a:p>
@@ -4349,7 +4350,7 @@
           <a:p>
             <a:fld id="{4C7FBE89-DCA5-4DC0-AB26-3C3EB1D6532B}" type="datetime1">
               <a:rPr lang="de-DE" smtClean="0"/>
-              <a:t>20.11.2020</a:t>
+              <a:t>23.11.2020</a:t>
             </a:fld>
             <a:endParaRPr lang="de-DE"/>
           </a:p>
@@ -4446,7 +4447,7 @@
           <a:p>
             <a:fld id="{4C7FBE89-DCA5-4DC0-AB26-3C3EB1D6532B}" type="datetime1">
               <a:rPr lang="de-DE" smtClean="0"/>
-              <a:t>20.11.2020</a:t>
+              <a:t>23.11.2020</a:t>
             </a:fld>
             <a:endParaRPr lang="de-DE"/>
           </a:p>
@@ -4706,7 +4707,7 @@
           <a:p>
             <a:fld id="{4C7FBE89-DCA5-4DC0-AB26-3C3EB1D6532B}" type="datetime1">
               <a:rPr lang="de-DE" smtClean="0"/>
-              <a:t>20.11.2020</a:t>
+              <a:t>23.11.2020</a:t>
             </a:fld>
             <a:endParaRPr lang="de-DE"/>
           </a:p>
@@ -5342,7 +5343,7 @@
           <a:p>
             <a:fld id="{4C7FBE89-DCA5-4DC0-AB26-3C3EB1D6532B}" type="datetime1">
               <a:rPr lang="de-DE" smtClean="0"/>
-              <a:t>20.11.2020</a:t>
+              <a:t>23.11.2020</a:t>
             </a:fld>
             <a:endParaRPr lang="de-DE"/>
           </a:p>
@@ -5625,7 +5626,7 @@
           <a:p>
             <a:fld id="{4C7FBE89-DCA5-4DC0-AB26-3C3EB1D6532B}" type="datetime1">
               <a:rPr lang="de-DE" smtClean="0"/>
-              <a:t>20.11.2020</a:t>
+              <a:t>23.11.2020</a:t>
             </a:fld>
             <a:endParaRPr lang="de-DE"/>
           </a:p>
@@ -5910,7 +5911,7 @@
           <a:p>
             <a:fld id="{4C7FBE89-DCA5-4DC0-AB26-3C3EB1D6532B}" type="datetime1">
               <a:rPr lang="de-DE" smtClean="0"/>
-              <a:t>20.11.2020</a:t>
+              <a:t>23.11.2020</a:t>
             </a:fld>
             <a:endParaRPr lang="de-DE"/>
           </a:p>
@@ -6188,7 +6189,7 @@
           <a:p>
             <a:fld id="{4C7FBE89-DCA5-4DC0-AB26-3C3EB1D6532B}" type="datetime1">
               <a:rPr lang="de-DE" smtClean="0"/>
-              <a:t>20.11.2020</a:t>
+              <a:t>23.11.2020</a:t>
             </a:fld>
             <a:endParaRPr lang="de-DE"/>
           </a:p>
@@ -6382,7 +6383,7 @@
           <a:p>
             <a:fld id="{4C7FBE89-DCA5-4DC0-AB26-3C3EB1D6532B}" type="datetime1">
               <a:rPr lang="de-DE" smtClean="0"/>
-              <a:t>20.11.2020</a:t>
+              <a:t>23.11.2020</a:t>
             </a:fld>
             <a:endParaRPr lang="de-DE"/>
           </a:p>
@@ -6527,6 +6528,2335 @@
     <p:extLst>
       <p:ext uri="{BB962C8B-B14F-4D97-AF65-F5344CB8AC3E}">
         <p14:creationId xmlns:p14="http://schemas.microsoft.com/office/powerpoint/2010/main" val="1285503323"/>
+      </p:ext>
+    </p:extLst>
+  </p:cSld>
+  <p:clrMapOvr>
+    <a:masterClrMapping/>
+  </p:clrMapOvr>
+</p:sld>
+</file>
+
+<file path=ppt/slides/slide9.xml><?xml version="1.0" encoding="utf-8"?>
+<p:sld xmlns:a="http://schemas.openxmlformats.org/drawingml/2006/main" xmlns:r="http://schemas.openxmlformats.org/officeDocument/2006/relationships" xmlns:p="http://schemas.openxmlformats.org/presentationml/2006/main">
+  <p:cSld>
+    <p:bg>
+      <p:bgPr>
+        <a:solidFill>
+          <a:schemeClr val="bg1"/>
+        </a:solidFill>
+        <a:effectLst/>
+      </p:bgPr>
+    </p:bg>
+    <p:spTree>
+      <p:nvGrpSpPr>
+        <p:cNvPr id="1" name=""/>
+        <p:cNvGrpSpPr/>
+        <p:nvPr/>
+      </p:nvGrpSpPr>
+      <p:grpSpPr>
+        <a:xfrm>
+          <a:off x="0" y="0"/>
+          <a:ext cx="0" cy="0"/>
+          <a:chOff x="0" y="0"/>
+          <a:chExt cx="0" cy="0"/>
+        </a:xfrm>
+      </p:grpSpPr>
+      <p:sp>
+        <p:nvSpPr>
+          <p:cNvPr id="11" name="Rectangle 10">
+            <a:extLst>
+              <a:ext uri="{FF2B5EF4-FFF2-40B4-BE49-F238E27FC236}">
+                <a16:creationId xmlns:a16="http://schemas.microsoft.com/office/drawing/2014/main" id="{A4AC5506-6312-4701-8D3C-40187889A947}"/>
+              </a:ext>
+              <a:ext uri="{C183D7F6-B498-43B3-948B-1728B52AA6E4}">
+                <adec:decorative xmlns:adec="http://schemas.microsoft.com/office/drawing/2017/decorative" val="1"/>
+              </a:ext>
+            </a:extLst>
+          </p:cNvPr>
+          <p:cNvSpPr>
+            <a:spLocks noGrp="1" noRot="1" noChangeAspect="1" noMove="1" noResize="1" noEditPoints="1" noAdjustHandles="1" noChangeArrowheads="1" noChangeShapeType="1" noTextEdit="1"/>
+          </p:cNvSpPr>
+          <p:nvPr>
+            <p:extLst>
+              <p:ext uri="{386F3935-93C4-4BCD-93E2-E3B085C9AB24}">
+                <p16:designElem xmlns:p16="http://schemas.microsoft.com/office/powerpoint/2015/main" val="1"/>
+              </p:ext>
+            </p:extLst>
+          </p:nvPr>
+        </p:nvSpPr>
+        <p:spPr>
+          <a:xfrm>
+            <a:off x="0" y="651752"/>
+            <a:ext cx="12192000" cy="736551"/>
+          </a:xfrm>
+          <a:prstGeom prst="rect">
+            <a:avLst/>
+          </a:prstGeom>
+          <a:solidFill>
+            <a:schemeClr val="tx1"/>
+          </a:solidFill>
+          <a:ln>
+            <a:noFill/>
+          </a:ln>
+        </p:spPr>
+        <p:style>
+          <a:lnRef idx="2">
+            <a:schemeClr val="accent1">
+              <a:shade val="50000"/>
+            </a:schemeClr>
+          </a:lnRef>
+          <a:fillRef idx="1">
+            <a:schemeClr val="accent1"/>
+          </a:fillRef>
+          <a:effectRef idx="0">
+            <a:schemeClr val="accent1"/>
+          </a:effectRef>
+          <a:fontRef idx="minor">
+            <a:schemeClr val="lt1"/>
+          </a:fontRef>
+        </p:style>
+        <p:txBody>
+          <a:bodyPr rtlCol="0" anchor="ctr"/>
+          <a:lstStyle/>
+          <a:p>
+            <a:pPr algn="ctr"/>
+            <a:endParaRPr lang="en-US"/>
+          </a:p>
+        </p:txBody>
+      </p:sp>
+      <p:sp>
+        <p:nvSpPr>
+          <p:cNvPr id="2" name="Titel 1">
+            <a:extLst>
+              <a:ext uri="{FF2B5EF4-FFF2-40B4-BE49-F238E27FC236}">
+                <a16:creationId xmlns:a16="http://schemas.microsoft.com/office/drawing/2014/main" id="{D324B786-82A5-4383-90FF-9AC673D99C49}"/>
+              </a:ext>
+            </a:extLst>
+          </p:cNvPr>
+          <p:cNvSpPr>
+            <a:spLocks noGrp="1"/>
+          </p:cNvSpPr>
+          <p:nvPr>
+            <p:ph type="title"/>
+          </p:nvPr>
+        </p:nvSpPr>
+        <p:spPr>
+          <a:xfrm>
+            <a:off x="556532" y="643467"/>
+            <a:ext cx="11210925" cy="744836"/>
+          </a:xfrm>
+        </p:spPr>
+        <p:txBody>
+          <a:bodyPr vert="horz" lIns="91440" tIns="45720" rIns="91440" bIns="45720" rtlCol="0" anchor="ctr">
+            <a:normAutofit/>
+          </a:bodyPr>
+          <a:lstStyle/>
+          <a:p>
+            <a:pPr algn="ctr"/>
+            <a:r>
+              <a:rPr lang="en-US" sz="3200" kern="1200">
+                <a:solidFill>
+                  <a:schemeClr val="bg1"/>
+                </a:solidFill>
+                <a:latin typeface="+mj-lt"/>
+                <a:ea typeface="+mj-ea"/>
+                <a:cs typeface="+mj-cs"/>
+              </a:rPr>
+              <a:t>Risikoanalyse</a:t>
+            </a:r>
+          </a:p>
+        </p:txBody>
+      </p:sp>
+      <p:sp>
+        <p:nvSpPr>
+          <p:cNvPr id="4" name="Datumsplatzhalter 3">
+            <a:extLst>
+              <a:ext uri="{FF2B5EF4-FFF2-40B4-BE49-F238E27FC236}">
+                <a16:creationId xmlns:a16="http://schemas.microsoft.com/office/drawing/2014/main" id="{C5F73EEE-D982-484F-8CAC-BFB6FCC13A0B}"/>
+              </a:ext>
+            </a:extLst>
+          </p:cNvPr>
+          <p:cNvSpPr>
+            <a:spLocks noGrp="1"/>
+          </p:cNvSpPr>
+          <p:nvPr>
+            <p:ph type="dt" sz="half" idx="10"/>
+          </p:nvPr>
+        </p:nvSpPr>
+        <p:spPr>
+          <a:xfrm>
+            <a:off x="838200" y="6356350"/>
+            <a:ext cx="2743200" cy="365125"/>
+          </a:xfrm>
+        </p:spPr>
+        <p:txBody>
+          <a:bodyPr vert="horz" lIns="91440" tIns="45720" rIns="91440" bIns="45720" rtlCol="0" anchor="ctr">
+            <a:normAutofit/>
+          </a:bodyPr>
+          <a:lstStyle/>
+          <a:p>
+            <a:pPr>
+              <a:spcAft>
+                <a:spcPts val="600"/>
+              </a:spcAft>
+            </a:pPr>
+            <a:fld id="{D051D121-2F98-4E5C-8353-0F3074D17C46}" type="datetime1">
+              <a:rPr lang="en-US" smtClean="0"/>
+              <a:pPr>
+                <a:spcAft>
+                  <a:spcPts val="600"/>
+                </a:spcAft>
+              </a:pPr>
+              <a:t>11/23/2020</a:t>
+            </a:fld>
+            <a:endParaRPr lang="en-US"/>
+          </a:p>
+        </p:txBody>
+      </p:sp>
+      <p:sp>
+        <p:nvSpPr>
+          <p:cNvPr id="5" name="Foliennummernplatzhalter 4">
+            <a:extLst>
+              <a:ext uri="{FF2B5EF4-FFF2-40B4-BE49-F238E27FC236}">
+                <a16:creationId xmlns:a16="http://schemas.microsoft.com/office/drawing/2014/main" id="{1C9E74C3-F930-490A-A536-7A7F9CF2EB12}"/>
+              </a:ext>
+            </a:extLst>
+          </p:cNvPr>
+          <p:cNvSpPr>
+            <a:spLocks noGrp="1"/>
+          </p:cNvSpPr>
+          <p:nvPr>
+            <p:ph type="sldNum" sz="quarter" idx="12"/>
+          </p:nvPr>
+        </p:nvSpPr>
+        <p:spPr>
+          <a:xfrm>
+            <a:off x="8610600" y="6356350"/>
+            <a:ext cx="2743200" cy="365125"/>
+          </a:xfrm>
+        </p:spPr>
+        <p:txBody>
+          <a:bodyPr vert="horz" lIns="91440" tIns="45720" rIns="91440" bIns="45720" rtlCol="0" anchor="ctr">
+            <a:normAutofit/>
+          </a:bodyPr>
+          <a:lstStyle/>
+          <a:p>
+            <a:pPr>
+              <a:spcAft>
+                <a:spcPts val="600"/>
+              </a:spcAft>
+            </a:pPr>
+            <a:fld id="{2D4C594A-0DAD-48BB-BE3B-8241EF812AB5}" type="slidenum">
+              <a:rPr lang="en-US" smtClean="0"/>
+              <a:pPr>
+                <a:spcAft>
+                  <a:spcPts val="600"/>
+                </a:spcAft>
+              </a:pPr>
+              <a:t>9</a:t>
+            </a:fld>
+            <a:endParaRPr lang="en-US"/>
+          </a:p>
+        </p:txBody>
+      </p:sp>
+      <p:graphicFrame>
+        <p:nvGraphicFramePr>
+          <p:cNvPr id="6" name="Inhaltsplatzhalter 5">
+            <a:extLst>
+              <a:ext uri="{FF2B5EF4-FFF2-40B4-BE49-F238E27FC236}">
+                <a16:creationId xmlns:a16="http://schemas.microsoft.com/office/drawing/2014/main" id="{E728AD47-B5B2-49CD-A7AB-13594803F111}"/>
+              </a:ext>
+            </a:extLst>
+          </p:cNvPr>
+          <p:cNvGraphicFramePr>
+            <a:graphicFrameLocks noGrp="1"/>
+          </p:cNvGraphicFramePr>
+          <p:nvPr>
+            <p:ph idx="1"/>
+            <p:extLst>
+              <p:ext uri="{D42A27DB-BD31-4B8C-83A1-F6EECF244321}">
+                <p14:modId xmlns:p14="http://schemas.microsoft.com/office/powerpoint/2010/main" val="2473785926"/>
+              </p:ext>
+            </p:extLst>
+          </p:nvPr>
+        </p:nvGraphicFramePr>
+        <p:xfrm>
+          <a:off x="972105" y="1675227"/>
+          <a:ext cx="10247792" cy="4394202"/>
+        </p:xfrm>
+        <a:graphic>
+          <a:graphicData uri="http://schemas.openxmlformats.org/drawingml/2006/table">
+            <a:tbl>
+              <a:tblPr firstRow="1" firstCol="1" bandRow="1"/>
+              <a:tblGrid>
+                <a:gridCol w="2828385">
+                  <a:extLst>
+                    <a:ext uri="{9D8B030D-6E8A-4147-A177-3AD203B41FA5}">
+                      <a16:colId xmlns:a16="http://schemas.microsoft.com/office/drawing/2014/main" val="1937100112"/>
+                    </a:ext>
+                  </a:extLst>
+                </a:gridCol>
+                <a:gridCol w="3697610">
+                  <a:extLst>
+                    <a:ext uri="{9D8B030D-6E8A-4147-A177-3AD203B41FA5}">
+                      <a16:colId xmlns:a16="http://schemas.microsoft.com/office/drawing/2014/main" val="1805933689"/>
+                    </a:ext>
+                  </a:extLst>
+                </a:gridCol>
+                <a:gridCol w="2745241">
+                  <a:extLst>
+                    <a:ext uri="{9D8B030D-6E8A-4147-A177-3AD203B41FA5}">
+                      <a16:colId xmlns:a16="http://schemas.microsoft.com/office/drawing/2014/main" val="210679154"/>
+                    </a:ext>
+                  </a:extLst>
+                </a:gridCol>
+                <a:gridCol w="976556">
+                  <a:extLst>
+                    <a:ext uri="{9D8B030D-6E8A-4147-A177-3AD203B41FA5}">
+                      <a16:colId xmlns:a16="http://schemas.microsoft.com/office/drawing/2014/main" val="3002741590"/>
+                    </a:ext>
+                  </a:extLst>
+                </a:gridCol>
+              </a:tblGrid>
+              <a:tr h="331969">
+                <a:tc>
+                  <a:txBody>
+                    <a:bodyPr/>
+                    <a:lstStyle/>
+                    <a:p>
+                      <a:pPr algn="l" fontAlgn="t">
+                        <a:lnSpc>
+                          <a:spcPct val="107000"/>
+                        </a:lnSpc>
+                        <a:spcBef>
+                          <a:spcPts val="0"/>
+                        </a:spcBef>
+                        <a:spcAft>
+                          <a:spcPts val="800"/>
+                        </a:spcAft>
+                      </a:pPr>
+                      <a:r>
+                        <a:rPr lang="de-DE" sz="1600" b="0" i="0" u="none" strike="noStrike">
+                          <a:effectLst/>
+                          <a:latin typeface="Calibri" panose="020F0502020204030204" pitchFamily="34" charset="0"/>
+                          <a:ea typeface="Calibri" panose="020F0502020204030204" pitchFamily="34" charset="0"/>
+                          <a:cs typeface="Times New Roman" panose="02020603050405020304" pitchFamily="18" charset="0"/>
+                        </a:rPr>
+                        <a:t>Bezeichnung</a:t>
+                      </a:r>
+                      <a:endParaRPr lang="de-DE" sz="2900" b="0" i="0" u="none" strike="noStrike">
+                        <a:effectLst/>
+                        <a:latin typeface="Arial" panose="020B0604020202020204" pitchFamily="34" charset="0"/>
+                      </a:endParaRPr>
+                    </a:p>
+                  </a:txBody>
+                  <a:tcPr marL="108842" marR="108842" marT="15117" marB="0">
+                    <a:lnL w="12700" cap="flat" cmpd="sng" algn="ctr">
+                      <a:solidFill>
+                        <a:srgbClr val="000000"/>
+                      </a:solidFill>
+                      <a:prstDash val="solid"/>
+                      <a:round/>
+                      <a:headEnd type="none" w="med" len="med"/>
+                      <a:tailEnd type="none" w="med" len="med"/>
+                    </a:lnL>
+                    <a:lnR w="12700" cap="flat" cmpd="sng" algn="ctr">
+                      <a:solidFill>
+                        <a:srgbClr val="000000"/>
+                      </a:solidFill>
+                      <a:prstDash val="solid"/>
+                      <a:round/>
+                      <a:headEnd type="none" w="med" len="med"/>
+                      <a:tailEnd type="none" w="med" len="med"/>
+                    </a:lnR>
+                    <a:lnT w="12700" cap="flat" cmpd="sng" algn="ctr">
+                      <a:solidFill>
+                        <a:srgbClr val="000000"/>
+                      </a:solidFill>
+                      <a:prstDash val="solid"/>
+                      <a:round/>
+                      <a:headEnd type="none" w="med" len="med"/>
+                      <a:tailEnd type="none" w="med" len="med"/>
+                    </a:lnT>
+                    <a:lnB w="12700" cap="flat" cmpd="sng" algn="ctr">
+                      <a:solidFill>
+                        <a:srgbClr val="000000"/>
+                      </a:solidFill>
+                      <a:prstDash val="solid"/>
+                      <a:round/>
+                      <a:headEnd type="none" w="med" len="med"/>
+                      <a:tailEnd type="none" w="med" len="med"/>
+                    </a:lnB>
+                  </a:tcPr>
+                </a:tc>
+                <a:tc>
+                  <a:txBody>
+                    <a:bodyPr/>
+                    <a:lstStyle/>
+                    <a:p>
+                      <a:pPr algn="l" fontAlgn="t">
+                        <a:lnSpc>
+                          <a:spcPct val="107000"/>
+                        </a:lnSpc>
+                        <a:spcBef>
+                          <a:spcPts val="0"/>
+                        </a:spcBef>
+                        <a:spcAft>
+                          <a:spcPts val="800"/>
+                        </a:spcAft>
+                      </a:pPr>
+                      <a:r>
+                        <a:rPr lang="de-DE" sz="1600" b="0" i="0" u="none" strike="noStrike">
+                          <a:effectLst/>
+                          <a:latin typeface="Calibri" panose="020F0502020204030204" pitchFamily="34" charset="0"/>
+                          <a:ea typeface="Calibri" panose="020F0502020204030204" pitchFamily="34" charset="0"/>
+                          <a:cs typeface="Times New Roman" panose="02020603050405020304" pitchFamily="18" charset="0"/>
+                        </a:rPr>
+                        <a:t>Ursache</a:t>
+                      </a:r>
+                      <a:endParaRPr lang="de-DE" sz="2900" b="0" i="0" u="none" strike="noStrike">
+                        <a:effectLst/>
+                        <a:latin typeface="Arial" panose="020B0604020202020204" pitchFamily="34" charset="0"/>
+                      </a:endParaRPr>
+                    </a:p>
+                  </a:txBody>
+                  <a:tcPr marL="108842" marR="108842" marT="15117" marB="0">
+                    <a:lnL w="12700" cap="flat" cmpd="sng" algn="ctr">
+                      <a:solidFill>
+                        <a:srgbClr val="000000"/>
+                      </a:solidFill>
+                      <a:prstDash val="solid"/>
+                      <a:round/>
+                      <a:headEnd type="none" w="med" len="med"/>
+                      <a:tailEnd type="none" w="med" len="med"/>
+                    </a:lnL>
+                    <a:lnR w="12700" cap="flat" cmpd="sng" algn="ctr">
+                      <a:solidFill>
+                        <a:srgbClr val="000000"/>
+                      </a:solidFill>
+                      <a:prstDash val="solid"/>
+                      <a:round/>
+                      <a:headEnd type="none" w="med" len="med"/>
+                      <a:tailEnd type="none" w="med" len="med"/>
+                    </a:lnR>
+                    <a:lnT w="12700" cap="flat" cmpd="sng" algn="ctr">
+                      <a:solidFill>
+                        <a:srgbClr val="000000"/>
+                      </a:solidFill>
+                      <a:prstDash val="solid"/>
+                      <a:round/>
+                      <a:headEnd type="none" w="med" len="med"/>
+                      <a:tailEnd type="none" w="med" len="med"/>
+                    </a:lnT>
+                    <a:lnB w="12700" cap="flat" cmpd="sng" algn="ctr">
+                      <a:solidFill>
+                        <a:srgbClr val="000000"/>
+                      </a:solidFill>
+                      <a:prstDash val="solid"/>
+                      <a:round/>
+                      <a:headEnd type="none" w="med" len="med"/>
+                      <a:tailEnd type="none" w="med" len="med"/>
+                    </a:lnB>
+                  </a:tcPr>
+                </a:tc>
+                <a:tc>
+                  <a:txBody>
+                    <a:bodyPr/>
+                    <a:lstStyle/>
+                    <a:p>
+                      <a:pPr algn="l" fontAlgn="t">
+                        <a:lnSpc>
+                          <a:spcPct val="107000"/>
+                        </a:lnSpc>
+                        <a:spcBef>
+                          <a:spcPts val="0"/>
+                        </a:spcBef>
+                        <a:spcAft>
+                          <a:spcPts val="800"/>
+                        </a:spcAft>
+                      </a:pPr>
+                      <a:r>
+                        <a:rPr lang="de-DE" sz="1600" b="0" i="0" u="none" strike="noStrike">
+                          <a:effectLst/>
+                          <a:latin typeface="Calibri" panose="020F0502020204030204" pitchFamily="34" charset="0"/>
+                          <a:ea typeface="Calibri" panose="020F0502020204030204" pitchFamily="34" charset="0"/>
+                          <a:cs typeface="Times New Roman" panose="02020603050405020304" pitchFamily="18" charset="0"/>
+                        </a:rPr>
+                        <a:t>Konsequenz</a:t>
+                      </a:r>
+                      <a:endParaRPr lang="de-DE" sz="2900" b="0" i="0" u="none" strike="noStrike">
+                        <a:effectLst/>
+                        <a:latin typeface="Arial" panose="020B0604020202020204" pitchFamily="34" charset="0"/>
+                      </a:endParaRPr>
+                    </a:p>
+                  </a:txBody>
+                  <a:tcPr marL="108842" marR="108842" marT="15117" marB="0">
+                    <a:lnL w="12700" cap="flat" cmpd="sng" algn="ctr">
+                      <a:solidFill>
+                        <a:srgbClr val="000000"/>
+                      </a:solidFill>
+                      <a:prstDash val="solid"/>
+                      <a:round/>
+                      <a:headEnd type="none" w="med" len="med"/>
+                      <a:tailEnd type="none" w="med" len="med"/>
+                    </a:lnL>
+                    <a:lnR w="12700" cap="flat" cmpd="sng" algn="ctr">
+                      <a:solidFill>
+                        <a:srgbClr val="000000"/>
+                      </a:solidFill>
+                      <a:prstDash val="solid"/>
+                      <a:round/>
+                      <a:headEnd type="none" w="med" len="med"/>
+                      <a:tailEnd type="none" w="med" len="med"/>
+                    </a:lnR>
+                    <a:lnT w="12700" cap="flat" cmpd="sng" algn="ctr">
+                      <a:solidFill>
+                        <a:srgbClr val="000000"/>
+                      </a:solidFill>
+                      <a:prstDash val="solid"/>
+                      <a:round/>
+                      <a:headEnd type="none" w="med" len="med"/>
+                      <a:tailEnd type="none" w="med" len="med"/>
+                    </a:lnT>
+                    <a:lnB w="12700" cap="flat" cmpd="sng" algn="ctr">
+                      <a:solidFill>
+                        <a:srgbClr val="000000"/>
+                      </a:solidFill>
+                      <a:prstDash val="solid"/>
+                      <a:round/>
+                      <a:headEnd type="none" w="med" len="med"/>
+                      <a:tailEnd type="none" w="med" len="med"/>
+                    </a:lnB>
+                  </a:tcPr>
+                </a:tc>
+                <a:tc>
+                  <a:txBody>
+                    <a:bodyPr/>
+                    <a:lstStyle/>
+                    <a:p>
+                      <a:pPr algn="l" fontAlgn="t">
+                        <a:lnSpc>
+                          <a:spcPct val="107000"/>
+                        </a:lnSpc>
+                        <a:spcBef>
+                          <a:spcPts val="0"/>
+                        </a:spcBef>
+                        <a:spcAft>
+                          <a:spcPts val="800"/>
+                        </a:spcAft>
+                      </a:pPr>
+                      <a:r>
+                        <a:rPr lang="de-DE" sz="1600" b="0" i="0" u="none" strike="noStrike">
+                          <a:effectLst/>
+                          <a:latin typeface="Calibri" panose="020F0502020204030204" pitchFamily="34" charset="0"/>
+                          <a:ea typeface="Calibri" panose="020F0502020204030204" pitchFamily="34" charset="0"/>
+                          <a:cs typeface="Times New Roman" panose="02020603050405020304" pitchFamily="18" charset="0"/>
+                        </a:rPr>
+                        <a:t>Ampel</a:t>
+                      </a:r>
+                      <a:endParaRPr lang="de-DE" sz="2900" b="0" i="0" u="none" strike="noStrike">
+                        <a:effectLst/>
+                        <a:latin typeface="Arial" panose="020B0604020202020204" pitchFamily="34" charset="0"/>
+                      </a:endParaRPr>
+                    </a:p>
+                  </a:txBody>
+                  <a:tcPr marL="108842" marR="108842" marT="15117" marB="0">
+                    <a:lnL w="12700" cap="flat" cmpd="sng" algn="ctr">
+                      <a:solidFill>
+                        <a:srgbClr val="000000"/>
+                      </a:solidFill>
+                      <a:prstDash val="solid"/>
+                      <a:round/>
+                      <a:headEnd type="none" w="med" len="med"/>
+                      <a:tailEnd type="none" w="med" len="med"/>
+                    </a:lnL>
+                    <a:lnR w="12700" cap="flat" cmpd="sng" algn="ctr">
+                      <a:solidFill>
+                        <a:srgbClr val="000000"/>
+                      </a:solidFill>
+                      <a:prstDash val="solid"/>
+                      <a:round/>
+                      <a:headEnd type="none" w="med" len="med"/>
+                      <a:tailEnd type="none" w="med" len="med"/>
+                    </a:lnR>
+                    <a:lnT w="12700" cap="flat" cmpd="sng" algn="ctr">
+                      <a:solidFill>
+                        <a:srgbClr val="000000"/>
+                      </a:solidFill>
+                      <a:prstDash val="solid"/>
+                      <a:round/>
+                      <a:headEnd type="none" w="med" len="med"/>
+                      <a:tailEnd type="none" w="med" len="med"/>
+                    </a:lnT>
+                    <a:lnB w="12700" cap="flat" cmpd="sng" algn="ctr">
+                      <a:solidFill>
+                        <a:srgbClr val="000000"/>
+                      </a:solidFill>
+                      <a:prstDash val="solid"/>
+                      <a:round/>
+                      <a:headEnd type="none" w="med" len="med"/>
+                      <a:tailEnd type="none" w="med" len="med"/>
+                    </a:lnB>
+                  </a:tcPr>
+                </a:tc>
+                <a:extLst>
+                  <a:ext uri="{0D108BD9-81ED-4DB2-BD59-A6C34878D82A}">
+                    <a16:rowId xmlns:a16="http://schemas.microsoft.com/office/drawing/2014/main" val="2301141173"/>
+                  </a:ext>
+                </a:extLst>
+              </a:tr>
+              <a:tr h="331969">
+                <a:tc>
+                  <a:txBody>
+                    <a:bodyPr/>
+                    <a:lstStyle/>
+                    <a:p>
+                      <a:pPr algn="l" fontAlgn="t">
+                        <a:lnSpc>
+                          <a:spcPct val="107000"/>
+                        </a:lnSpc>
+                        <a:spcBef>
+                          <a:spcPts val="0"/>
+                        </a:spcBef>
+                        <a:spcAft>
+                          <a:spcPts val="800"/>
+                        </a:spcAft>
+                      </a:pPr>
+                      <a:r>
+                        <a:rPr lang="de-DE" sz="1600" b="0" i="0" u="none" strike="noStrike">
+                          <a:effectLst/>
+                          <a:latin typeface="Calibri" panose="020F0502020204030204" pitchFamily="34" charset="0"/>
+                          <a:ea typeface="Calibri" panose="020F0502020204030204" pitchFamily="34" charset="0"/>
+                          <a:cs typeface="Times New Roman" panose="02020603050405020304" pitchFamily="18" charset="0"/>
+                        </a:rPr>
+                        <a:t> </a:t>
+                      </a:r>
+                      <a:endParaRPr lang="de-DE" sz="2900" b="0" i="0" u="none" strike="noStrike">
+                        <a:effectLst/>
+                        <a:latin typeface="Arial" panose="020B0604020202020204" pitchFamily="34" charset="0"/>
+                      </a:endParaRPr>
+                    </a:p>
+                  </a:txBody>
+                  <a:tcPr marL="108842" marR="108842" marT="15117" marB="0">
+                    <a:lnL w="12700" cap="flat" cmpd="sng" algn="ctr">
+                      <a:solidFill>
+                        <a:srgbClr val="000000"/>
+                      </a:solidFill>
+                      <a:prstDash val="solid"/>
+                      <a:round/>
+                      <a:headEnd type="none" w="med" len="med"/>
+                      <a:tailEnd type="none" w="med" len="med"/>
+                    </a:lnL>
+                    <a:lnR w="12700" cap="flat" cmpd="sng" algn="ctr">
+                      <a:solidFill>
+                        <a:srgbClr val="000000"/>
+                      </a:solidFill>
+                      <a:prstDash val="solid"/>
+                      <a:round/>
+                      <a:headEnd type="none" w="med" len="med"/>
+                      <a:tailEnd type="none" w="med" len="med"/>
+                    </a:lnR>
+                    <a:lnT w="12700" cap="flat" cmpd="sng" algn="ctr">
+                      <a:solidFill>
+                        <a:srgbClr val="000000"/>
+                      </a:solidFill>
+                      <a:prstDash val="solid"/>
+                      <a:round/>
+                      <a:headEnd type="none" w="med" len="med"/>
+                      <a:tailEnd type="none" w="med" len="med"/>
+                    </a:lnT>
+                    <a:lnB w="12700" cap="flat" cmpd="sng" algn="ctr">
+                      <a:solidFill>
+                        <a:srgbClr val="000000"/>
+                      </a:solidFill>
+                      <a:prstDash val="solid"/>
+                      <a:round/>
+                      <a:headEnd type="none" w="med" len="med"/>
+                      <a:tailEnd type="none" w="med" len="med"/>
+                    </a:lnB>
+                  </a:tcPr>
+                </a:tc>
+                <a:tc>
+                  <a:txBody>
+                    <a:bodyPr/>
+                    <a:lstStyle/>
+                    <a:p>
+                      <a:pPr algn="l" fontAlgn="t">
+                        <a:lnSpc>
+                          <a:spcPct val="107000"/>
+                        </a:lnSpc>
+                        <a:spcBef>
+                          <a:spcPts val="0"/>
+                        </a:spcBef>
+                        <a:spcAft>
+                          <a:spcPts val="800"/>
+                        </a:spcAft>
+                      </a:pPr>
+                      <a:r>
+                        <a:rPr lang="de-DE" sz="1600" b="0" i="0" u="none" strike="noStrike">
+                          <a:effectLst/>
+                          <a:latin typeface="Calibri" panose="020F0502020204030204" pitchFamily="34" charset="0"/>
+                          <a:ea typeface="Calibri" panose="020F0502020204030204" pitchFamily="34" charset="0"/>
+                          <a:cs typeface="Times New Roman" panose="02020603050405020304" pitchFamily="18" charset="0"/>
+                        </a:rPr>
+                        <a:t> </a:t>
+                      </a:r>
+                      <a:endParaRPr lang="de-DE" sz="2900" b="0" i="0" u="none" strike="noStrike">
+                        <a:effectLst/>
+                        <a:latin typeface="Arial" panose="020B0604020202020204" pitchFamily="34" charset="0"/>
+                      </a:endParaRPr>
+                    </a:p>
+                  </a:txBody>
+                  <a:tcPr marL="108842" marR="108842" marT="15117" marB="0">
+                    <a:lnL w="12700" cap="flat" cmpd="sng" algn="ctr">
+                      <a:solidFill>
+                        <a:srgbClr val="000000"/>
+                      </a:solidFill>
+                      <a:prstDash val="solid"/>
+                      <a:round/>
+                      <a:headEnd type="none" w="med" len="med"/>
+                      <a:tailEnd type="none" w="med" len="med"/>
+                    </a:lnL>
+                    <a:lnR w="12700" cap="flat" cmpd="sng" algn="ctr">
+                      <a:solidFill>
+                        <a:srgbClr val="000000"/>
+                      </a:solidFill>
+                      <a:prstDash val="solid"/>
+                      <a:round/>
+                      <a:headEnd type="none" w="med" len="med"/>
+                      <a:tailEnd type="none" w="med" len="med"/>
+                    </a:lnR>
+                    <a:lnT w="12700" cap="flat" cmpd="sng" algn="ctr">
+                      <a:solidFill>
+                        <a:srgbClr val="000000"/>
+                      </a:solidFill>
+                      <a:prstDash val="solid"/>
+                      <a:round/>
+                      <a:headEnd type="none" w="med" len="med"/>
+                      <a:tailEnd type="none" w="med" len="med"/>
+                    </a:lnT>
+                    <a:lnB w="12700" cap="flat" cmpd="sng" algn="ctr">
+                      <a:solidFill>
+                        <a:srgbClr val="000000"/>
+                      </a:solidFill>
+                      <a:prstDash val="solid"/>
+                      <a:round/>
+                      <a:headEnd type="none" w="med" len="med"/>
+                      <a:tailEnd type="none" w="med" len="med"/>
+                    </a:lnB>
+                  </a:tcPr>
+                </a:tc>
+                <a:tc>
+                  <a:txBody>
+                    <a:bodyPr/>
+                    <a:lstStyle/>
+                    <a:p>
+                      <a:pPr algn="l" fontAlgn="t">
+                        <a:lnSpc>
+                          <a:spcPct val="107000"/>
+                        </a:lnSpc>
+                        <a:spcBef>
+                          <a:spcPts val="0"/>
+                        </a:spcBef>
+                        <a:spcAft>
+                          <a:spcPts val="800"/>
+                        </a:spcAft>
+                      </a:pPr>
+                      <a:r>
+                        <a:rPr lang="de-DE" sz="1600" b="0" i="0" u="none" strike="noStrike">
+                          <a:effectLst/>
+                          <a:latin typeface="Calibri" panose="020F0502020204030204" pitchFamily="34" charset="0"/>
+                          <a:ea typeface="Calibri" panose="020F0502020204030204" pitchFamily="34" charset="0"/>
+                          <a:cs typeface="Times New Roman" panose="02020603050405020304" pitchFamily="18" charset="0"/>
+                        </a:rPr>
+                        <a:t> </a:t>
+                      </a:r>
+                      <a:endParaRPr lang="de-DE" sz="2900" b="0" i="0" u="none" strike="noStrike">
+                        <a:effectLst/>
+                        <a:latin typeface="Arial" panose="020B0604020202020204" pitchFamily="34" charset="0"/>
+                      </a:endParaRPr>
+                    </a:p>
+                  </a:txBody>
+                  <a:tcPr marL="108842" marR="108842" marT="15117" marB="0">
+                    <a:lnL w="12700" cap="flat" cmpd="sng" algn="ctr">
+                      <a:solidFill>
+                        <a:srgbClr val="000000"/>
+                      </a:solidFill>
+                      <a:prstDash val="solid"/>
+                      <a:round/>
+                      <a:headEnd type="none" w="med" len="med"/>
+                      <a:tailEnd type="none" w="med" len="med"/>
+                    </a:lnL>
+                    <a:lnR w="12700" cap="flat" cmpd="sng" algn="ctr">
+                      <a:solidFill>
+                        <a:srgbClr val="000000"/>
+                      </a:solidFill>
+                      <a:prstDash val="solid"/>
+                      <a:round/>
+                      <a:headEnd type="none" w="med" len="med"/>
+                      <a:tailEnd type="none" w="med" len="med"/>
+                    </a:lnR>
+                    <a:lnT w="12700" cap="flat" cmpd="sng" algn="ctr">
+                      <a:solidFill>
+                        <a:srgbClr val="000000"/>
+                      </a:solidFill>
+                      <a:prstDash val="solid"/>
+                      <a:round/>
+                      <a:headEnd type="none" w="med" len="med"/>
+                      <a:tailEnd type="none" w="med" len="med"/>
+                    </a:lnT>
+                    <a:lnB w="12700" cap="flat" cmpd="sng" algn="ctr">
+                      <a:solidFill>
+                        <a:srgbClr val="000000"/>
+                      </a:solidFill>
+                      <a:prstDash val="solid"/>
+                      <a:round/>
+                      <a:headEnd type="none" w="med" len="med"/>
+                      <a:tailEnd type="none" w="med" len="med"/>
+                    </a:lnB>
+                  </a:tcPr>
+                </a:tc>
+                <a:tc>
+                  <a:txBody>
+                    <a:bodyPr/>
+                    <a:lstStyle/>
+                    <a:p>
+                      <a:pPr algn="l" fontAlgn="t">
+                        <a:lnSpc>
+                          <a:spcPct val="107000"/>
+                        </a:lnSpc>
+                        <a:spcBef>
+                          <a:spcPts val="0"/>
+                        </a:spcBef>
+                        <a:spcAft>
+                          <a:spcPts val="800"/>
+                        </a:spcAft>
+                      </a:pPr>
+                      <a:r>
+                        <a:rPr lang="de-DE" sz="1600" b="0" i="0" u="none" strike="noStrike">
+                          <a:effectLst/>
+                          <a:latin typeface="Calibri" panose="020F0502020204030204" pitchFamily="34" charset="0"/>
+                          <a:ea typeface="Calibri" panose="020F0502020204030204" pitchFamily="34" charset="0"/>
+                          <a:cs typeface="Times New Roman" panose="02020603050405020304" pitchFamily="18" charset="0"/>
+                        </a:rPr>
+                        <a:t> </a:t>
+                      </a:r>
+                      <a:endParaRPr lang="de-DE" sz="2900" b="0" i="0" u="none" strike="noStrike">
+                        <a:effectLst/>
+                        <a:latin typeface="Arial" panose="020B0604020202020204" pitchFamily="34" charset="0"/>
+                      </a:endParaRPr>
+                    </a:p>
+                  </a:txBody>
+                  <a:tcPr marL="108842" marR="108842" marT="15117" marB="0">
+                    <a:lnL w="12700" cap="flat" cmpd="sng" algn="ctr">
+                      <a:solidFill>
+                        <a:srgbClr val="000000"/>
+                      </a:solidFill>
+                      <a:prstDash val="solid"/>
+                      <a:round/>
+                      <a:headEnd type="none" w="med" len="med"/>
+                      <a:tailEnd type="none" w="med" len="med"/>
+                    </a:lnL>
+                    <a:lnR w="12700" cap="flat" cmpd="sng" algn="ctr">
+                      <a:solidFill>
+                        <a:srgbClr val="000000"/>
+                      </a:solidFill>
+                      <a:prstDash val="solid"/>
+                      <a:round/>
+                      <a:headEnd type="none" w="med" len="med"/>
+                      <a:tailEnd type="none" w="med" len="med"/>
+                    </a:lnR>
+                    <a:lnT w="12700" cap="flat" cmpd="sng" algn="ctr">
+                      <a:solidFill>
+                        <a:srgbClr val="000000"/>
+                      </a:solidFill>
+                      <a:prstDash val="solid"/>
+                      <a:round/>
+                      <a:headEnd type="none" w="med" len="med"/>
+                      <a:tailEnd type="none" w="med" len="med"/>
+                    </a:lnT>
+                    <a:lnB w="12700" cap="flat" cmpd="sng" algn="ctr">
+                      <a:solidFill>
+                        <a:srgbClr val="000000"/>
+                      </a:solidFill>
+                      <a:prstDash val="solid"/>
+                      <a:round/>
+                      <a:headEnd type="none" w="med" len="med"/>
+                      <a:tailEnd type="none" w="med" len="med"/>
+                    </a:lnB>
+                  </a:tcPr>
+                </a:tc>
+                <a:extLst>
+                  <a:ext uri="{0D108BD9-81ED-4DB2-BD59-A6C34878D82A}">
+                    <a16:rowId xmlns:a16="http://schemas.microsoft.com/office/drawing/2014/main" val="2564595019"/>
+                  </a:ext>
+                </a:extLst>
+              </a:tr>
+              <a:tr h="590771">
+                <a:tc>
+                  <a:txBody>
+                    <a:bodyPr/>
+                    <a:lstStyle/>
+                    <a:p>
+                      <a:pPr algn="l" fontAlgn="t">
+                        <a:lnSpc>
+                          <a:spcPct val="107000"/>
+                        </a:lnSpc>
+                        <a:spcBef>
+                          <a:spcPts val="0"/>
+                        </a:spcBef>
+                        <a:spcAft>
+                          <a:spcPts val="800"/>
+                        </a:spcAft>
+                      </a:pPr>
+                      <a:r>
+                        <a:rPr lang="de-DE" sz="1600" b="0" i="0" u="none" strike="noStrike">
+                          <a:effectLst/>
+                          <a:latin typeface="Calibri" panose="020F0502020204030204" pitchFamily="34" charset="0"/>
+                          <a:ea typeface="Calibri" panose="020F0502020204030204" pitchFamily="34" charset="0"/>
+                          <a:cs typeface="Times New Roman" panose="02020603050405020304" pitchFamily="18" charset="0"/>
+                        </a:rPr>
+                        <a:t>Projekt wird nicht fertig gestellt</a:t>
+                      </a:r>
+                      <a:endParaRPr lang="de-DE" sz="2900" b="0" i="0" u="none" strike="noStrike">
+                        <a:effectLst/>
+                        <a:latin typeface="Arial" panose="020B0604020202020204" pitchFamily="34" charset="0"/>
+                      </a:endParaRPr>
+                    </a:p>
+                  </a:txBody>
+                  <a:tcPr marL="108842" marR="108842" marT="15117" marB="0">
+                    <a:lnL w="12700" cap="flat" cmpd="sng" algn="ctr">
+                      <a:solidFill>
+                        <a:srgbClr val="000000"/>
+                      </a:solidFill>
+                      <a:prstDash val="solid"/>
+                      <a:round/>
+                      <a:headEnd type="none" w="med" len="med"/>
+                      <a:tailEnd type="none" w="med" len="med"/>
+                    </a:lnL>
+                    <a:lnR w="12700" cap="flat" cmpd="sng" algn="ctr">
+                      <a:solidFill>
+                        <a:srgbClr val="000000"/>
+                      </a:solidFill>
+                      <a:prstDash val="solid"/>
+                      <a:round/>
+                      <a:headEnd type="none" w="med" len="med"/>
+                      <a:tailEnd type="none" w="med" len="med"/>
+                    </a:lnR>
+                    <a:lnT w="12700" cap="flat" cmpd="sng" algn="ctr">
+                      <a:solidFill>
+                        <a:srgbClr val="000000"/>
+                      </a:solidFill>
+                      <a:prstDash val="solid"/>
+                      <a:round/>
+                      <a:headEnd type="none" w="med" len="med"/>
+                      <a:tailEnd type="none" w="med" len="med"/>
+                    </a:lnT>
+                    <a:lnB w="12700" cap="flat" cmpd="sng" algn="ctr">
+                      <a:solidFill>
+                        <a:srgbClr val="000000"/>
+                      </a:solidFill>
+                      <a:prstDash val="solid"/>
+                      <a:round/>
+                      <a:headEnd type="none" w="med" len="med"/>
+                      <a:tailEnd type="none" w="med" len="med"/>
+                    </a:lnB>
+                  </a:tcPr>
+                </a:tc>
+                <a:tc>
+                  <a:txBody>
+                    <a:bodyPr/>
+                    <a:lstStyle/>
+                    <a:p>
+                      <a:pPr algn="l" fontAlgn="t">
+                        <a:lnSpc>
+                          <a:spcPct val="107000"/>
+                        </a:lnSpc>
+                        <a:spcBef>
+                          <a:spcPts val="0"/>
+                        </a:spcBef>
+                        <a:spcAft>
+                          <a:spcPts val="800"/>
+                        </a:spcAft>
+                      </a:pPr>
+                      <a:r>
+                        <a:rPr lang="de-DE" sz="1600" b="0" i="0" u="none" strike="noStrike">
+                          <a:effectLst/>
+                          <a:latin typeface="Calibri" panose="020F0502020204030204" pitchFamily="34" charset="0"/>
+                          <a:ea typeface="Calibri" panose="020F0502020204030204" pitchFamily="34" charset="0"/>
+                          <a:cs typeface="Times New Roman" panose="02020603050405020304" pitchFamily="18" charset="0"/>
+                        </a:rPr>
+                        <a:t>Zeitmangel, Kapazitätsmangel</a:t>
+                      </a:r>
+                      <a:endParaRPr lang="de-DE" sz="2900" b="0" i="0" u="none" strike="noStrike">
+                        <a:effectLst/>
+                        <a:latin typeface="Arial" panose="020B0604020202020204" pitchFamily="34" charset="0"/>
+                      </a:endParaRPr>
+                    </a:p>
+                  </a:txBody>
+                  <a:tcPr marL="108842" marR="108842" marT="15117" marB="0">
+                    <a:lnL w="12700" cap="flat" cmpd="sng" algn="ctr">
+                      <a:solidFill>
+                        <a:srgbClr val="000000"/>
+                      </a:solidFill>
+                      <a:prstDash val="solid"/>
+                      <a:round/>
+                      <a:headEnd type="none" w="med" len="med"/>
+                      <a:tailEnd type="none" w="med" len="med"/>
+                    </a:lnL>
+                    <a:lnR w="12700" cap="flat" cmpd="sng" algn="ctr">
+                      <a:solidFill>
+                        <a:srgbClr val="000000"/>
+                      </a:solidFill>
+                      <a:prstDash val="solid"/>
+                      <a:round/>
+                      <a:headEnd type="none" w="med" len="med"/>
+                      <a:tailEnd type="none" w="med" len="med"/>
+                    </a:lnR>
+                    <a:lnT w="12700" cap="flat" cmpd="sng" algn="ctr">
+                      <a:solidFill>
+                        <a:srgbClr val="000000"/>
+                      </a:solidFill>
+                      <a:prstDash val="solid"/>
+                      <a:round/>
+                      <a:headEnd type="none" w="med" len="med"/>
+                      <a:tailEnd type="none" w="med" len="med"/>
+                    </a:lnT>
+                    <a:lnB w="12700" cap="flat" cmpd="sng" algn="ctr">
+                      <a:solidFill>
+                        <a:srgbClr val="000000"/>
+                      </a:solidFill>
+                      <a:prstDash val="solid"/>
+                      <a:round/>
+                      <a:headEnd type="none" w="med" len="med"/>
+                      <a:tailEnd type="none" w="med" len="med"/>
+                    </a:lnB>
+                  </a:tcPr>
+                </a:tc>
+                <a:tc>
+                  <a:txBody>
+                    <a:bodyPr/>
+                    <a:lstStyle/>
+                    <a:p>
+                      <a:pPr algn="l" fontAlgn="t">
+                        <a:lnSpc>
+                          <a:spcPct val="107000"/>
+                        </a:lnSpc>
+                        <a:spcBef>
+                          <a:spcPts val="0"/>
+                        </a:spcBef>
+                        <a:spcAft>
+                          <a:spcPts val="800"/>
+                        </a:spcAft>
+                      </a:pPr>
+                      <a:r>
+                        <a:rPr lang="de-DE" sz="1600" b="0" i="0" u="none" strike="noStrike">
+                          <a:effectLst/>
+                          <a:latin typeface="Calibri" panose="020F0502020204030204" pitchFamily="34" charset="0"/>
+                          <a:ea typeface="Calibri" panose="020F0502020204030204" pitchFamily="34" charset="0"/>
+                          <a:cs typeface="Times New Roman" panose="02020603050405020304" pitchFamily="18" charset="0"/>
+                        </a:rPr>
+                        <a:t>Frühzeitiges Erkennen von Rückständen</a:t>
+                      </a:r>
+                      <a:endParaRPr lang="de-DE" sz="2900" b="0" i="0" u="none" strike="noStrike">
+                        <a:effectLst/>
+                        <a:latin typeface="Arial" panose="020B0604020202020204" pitchFamily="34" charset="0"/>
+                      </a:endParaRPr>
+                    </a:p>
+                  </a:txBody>
+                  <a:tcPr marL="108842" marR="108842" marT="15117" marB="0">
+                    <a:lnL w="12700" cap="flat" cmpd="sng" algn="ctr">
+                      <a:solidFill>
+                        <a:srgbClr val="000000"/>
+                      </a:solidFill>
+                      <a:prstDash val="solid"/>
+                      <a:round/>
+                      <a:headEnd type="none" w="med" len="med"/>
+                      <a:tailEnd type="none" w="med" len="med"/>
+                    </a:lnL>
+                    <a:lnR w="12700" cap="flat" cmpd="sng" algn="ctr">
+                      <a:solidFill>
+                        <a:srgbClr val="000000"/>
+                      </a:solidFill>
+                      <a:prstDash val="solid"/>
+                      <a:round/>
+                      <a:headEnd type="none" w="med" len="med"/>
+                      <a:tailEnd type="none" w="med" len="med"/>
+                    </a:lnR>
+                    <a:lnT w="12700" cap="flat" cmpd="sng" algn="ctr">
+                      <a:solidFill>
+                        <a:srgbClr val="000000"/>
+                      </a:solidFill>
+                      <a:prstDash val="solid"/>
+                      <a:round/>
+                      <a:headEnd type="none" w="med" len="med"/>
+                      <a:tailEnd type="none" w="med" len="med"/>
+                    </a:lnT>
+                    <a:lnB w="12700" cap="flat" cmpd="sng" algn="ctr">
+                      <a:solidFill>
+                        <a:srgbClr val="000000"/>
+                      </a:solidFill>
+                      <a:prstDash val="solid"/>
+                      <a:round/>
+                      <a:headEnd type="none" w="med" len="med"/>
+                      <a:tailEnd type="none" w="med" len="med"/>
+                    </a:lnB>
+                  </a:tcPr>
+                </a:tc>
+                <a:tc>
+                  <a:txBody>
+                    <a:bodyPr/>
+                    <a:lstStyle/>
+                    <a:p>
+                      <a:pPr algn="l" fontAlgn="t">
+                        <a:lnSpc>
+                          <a:spcPct val="107000"/>
+                        </a:lnSpc>
+                        <a:spcBef>
+                          <a:spcPts val="0"/>
+                        </a:spcBef>
+                        <a:spcAft>
+                          <a:spcPts val="800"/>
+                        </a:spcAft>
+                      </a:pPr>
+                      <a:r>
+                        <a:rPr lang="de-DE" sz="1600" b="0" i="0" u="none" strike="noStrike">
+                          <a:effectLst/>
+                          <a:latin typeface="Calibri" panose="020F0502020204030204" pitchFamily="34" charset="0"/>
+                          <a:ea typeface="Calibri" panose="020F0502020204030204" pitchFamily="34" charset="0"/>
+                          <a:cs typeface="Times New Roman" panose="02020603050405020304" pitchFamily="18" charset="0"/>
+                        </a:rPr>
+                        <a:t> </a:t>
+                      </a:r>
+                      <a:endParaRPr lang="de-DE" sz="2900" b="0" i="0" u="none" strike="noStrike">
+                        <a:effectLst/>
+                        <a:latin typeface="Arial" panose="020B0604020202020204" pitchFamily="34" charset="0"/>
+                      </a:endParaRPr>
+                    </a:p>
+                  </a:txBody>
+                  <a:tcPr marL="108842" marR="108842" marT="15117" marB="0">
+                    <a:lnL w="12700" cap="flat" cmpd="sng" algn="ctr">
+                      <a:solidFill>
+                        <a:srgbClr val="000000"/>
+                      </a:solidFill>
+                      <a:prstDash val="solid"/>
+                      <a:round/>
+                      <a:headEnd type="none" w="med" len="med"/>
+                      <a:tailEnd type="none" w="med" len="med"/>
+                    </a:lnL>
+                    <a:lnR w="12700" cap="flat" cmpd="sng" algn="ctr">
+                      <a:solidFill>
+                        <a:srgbClr val="000000"/>
+                      </a:solidFill>
+                      <a:prstDash val="solid"/>
+                      <a:round/>
+                      <a:headEnd type="none" w="med" len="med"/>
+                      <a:tailEnd type="none" w="med" len="med"/>
+                    </a:lnR>
+                    <a:lnT w="12700" cap="flat" cmpd="sng" algn="ctr">
+                      <a:solidFill>
+                        <a:srgbClr val="000000"/>
+                      </a:solidFill>
+                      <a:prstDash val="solid"/>
+                      <a:round/>
+                      <a:headEnd type="none" w="med" len="med"/>
+                      <a:tailEnd type="none" w="med" len="med"/>
+                    </a:lnT>
+                    <a:lnB w="12700" cap="flat" cmpd="sng" algn="ctr">
+                      <a:solidFill>
+                        <a:srgbClr val="000000"/>
+                      </a:solidFill>
+                      <a:prstDash val="solid"/>
+                      <a:round/>
+                      <a:headEnd type="none" w="med" len="med"/>
+                      <a:tailEnd type="none" w="med" len="med"/>
+                    </a:lnB>
+                    <a:solidFill>
+                      <a:srgbClr val="FF0000"/>
+                    </a:solidFill>
+                  </a:tcPr>
+                </a:tc>
+                <a:extLst>
+                  <a:ext uri="{0D108BD9-81ED-4DB2-BD59-A6C34878D82A}">
+                    <a16:rowId xmlns:a16="http://schemas.microsoft.com/office/drawing/2014/main" val="2187251753"/>
+                  </a:ext>
+                </a:extLst>
+              </a:tr>
+              <a:tr h="590771">
+                <a:tc>
+                  <a:txBody>
+                    <a:bodyPr/>
+                    <a:lstStyle/>
+                    <a:p>
+                      <a:pPr algn="l" fontAlgn="t">
+                        <a:lnSpc>
+                          <a:spcPct val="107000"/>
+                        </a:lnSpc>
+                        <a:spcBef>
+                          <a:spcPts val="0"/>
+                        </a:spcBef>
+                        <a:spcAft>
+                          <a:spcPts val="800"/>
+                        </a:spcAft>
+                      </a:pPr>
+                      <a:r>
+                        <a:rPr lang="de-DE" sz="1600" b="0" i="0" u="none" strike="noStrike">
+                          <a:effectLst/>
+                          <a:latin typeface="Calibri" panose="020F0502020204030204" pitchFamily="34" charset="0"/>
+                          <a:ea typeface="Calibri" panose="020F0502020204030204" pitchFamily="34" charset="0"/>
+                          <a:cs typeface="Times New Roman" panose="02020603050405020304" pitchFamily="18" charset="0"/>
+                        </a:rPr>
+                        <a:t>System misst falsch oder gar nicht</a:t>
+                      </a:r>
+                      <a:endParaRPr lang="de-DE" sz="2900" b="0" i="0" u="none" strike="noStrike">
+                        <a:effectLst/>
+                        <a:latin typeface="Arial" panose="020B0604020202020204" pitchFamily="34" charset="0"/>
+                      </a:endParaRPr>
+                    </a:p>
+                  </a:txBody>
+                  <a:tcPr marL="108842" marR="108842" marT="15117" marB="0">
+                    <a:lnL w="12700" cap="flat" cmpd="sng" algn="ctr">
+                      <a:solidFill>
+                        <a:srgbClr val="000000"/>
+                      </a:solidFill>
+                      <a:prstDash val="solid"/>
+                      <a:round/>
+                      <a:headEnd type="none" w="med" len="med"/>
+                      <a:tailEnd type="none" w="med" len="med"/>
+                    </a:lnL>
+                    <a:lnR w="12700" cap="flat" cmpd="sng" algn="ctr">
+                      <a:solidFill>
+                        <a:srgbClr val="000000"/>
+                      </a:solidFill>
+                      <a:prstDash val="solid"/>
+                      <a:round/>
+                      <a:headEnd type="none" w="med" len="med"/>
+                      <a:tailEnd type="none" w="med" len="med"/>
+                    </a:lnR>
+                    <a:lnT w="12700" cap="flat" cmpd="sng" algn="ctr">
+                      <a:solidFill>
+                        <a:srgbClr val="000000"/>
+                      </a:solidFill>
+                      <a:prstDash val="solid"/>
+                      <a:round/>
+                      <a:headEnd type="none" w="med" len="med"/>
+                      <a:tailEnd type="none" w="med" len="med"/>
+                    </a:lnT>
+                    <a:lnB w="12700" cap="flat" cmpd="sng" algn="ctr">
+                      <a:solidFill>
+                        <a:srgbClr val="000000"/>
+                      </a:solidFill>
+                      <a:prstDash val="solid"/>
+                      <a:round/>
+                      <a:headEnd type="none" w="med" len="med"/>
+                      <a:tailEnd type="none" w="med" len="med"/>
+                    </a:lnB>
+                  </a:tcPr>
+                </a:tc>
+                <a:tc>
+                  <a:txBody>
+                    <a:bodyPr/>
+                    <a:lstStyle/>
+                    <a:p>
+                      <a:pPr algn="l" fontAlgn="t">
+                        <a:lnSpc>
+                          <a:spcPct val="107000"/>
+                        </a:lnSpc>
+                        <a:spcBef>
+                          <a:spcPts val="0"/>
+                        </a:spcBef>
+                        <a:spcAft>
+                          <a:spcPts val="800"/>
+                        </a:spcAft>
+                      </a:pPr>
+                      <a:r>
+                        <a:rPr lang="de-DE" sz="1600" b="0" i="0" u="none" strike="noStrike">
+                          <a:effectLst/>
+                          <a:latin typeface="Calibri" panose="020F0502020204030204" pitchFamily="34" charset="0"/>
+                          <a:ea typeface="Calibri" panose="020F0502020204030204" pitchFamily="34" charset="0"/>
+                          <a:cs typeface="Times New Roman" panose="02020603050405020304" pitchFamily="18" charset="0"/>
+                        </a:rPr>
+                        <a:t>Ungenauigkeiten, Messergebnisse, Logik</a:t>
+                      </a:r>
+                      <a:endParaRPr lang="de-DE" sz="2900" b="0" i="0" u="none" strike="noStrike">
+                        <a:effectLst/>
+                        <a:latin typeface="Arial" panose="020B0604020202020204" pitchFamily="34" charset="0"/>
+                      </a:endParaRPr>
+                    </a:p>
+                  </a:txBody>
+                  <a:tcPr marL="108842" marR="108842" marT="15117" marB="0">
+                    <a:lnL w="12700" cap="flat" cmpd="sng" algn="ctr">
+                      <a:solidFill>
+                        <a:srgbClr val="000000"/>
+                      </a:solidFill>
+                      <a:prstDash val="solid"/>
+                      <a:round/>
+                      <a:headEnd type="none" w="med" len="med"/>
+                      <a:tailEnd type="none" w="med" len="med"/>
+                    </a:lnL>
+                    <a:lnR w="12700" cap="flat" cmpd="sng" algn="ctr">
+                      <a:solidFill>
+                        <a:srgbClr val="000000"/>
+                      </a:solidFill>
+                      <a:prstDash val="solid"/>
+                      <a:round/>
+                      <a:headEnd type="none" w="med" len="med"/>
+                      <a:tailEnd type="none" w="med" len="med"/>
+                    </a:lnR>
+                    <a:lnT w="12700" cap="flat" cmpd="sng" algn="ctr">
+                      <a:solidFill>
+                        <a:srgbClr val="000000"/>
+                      </a:solidFill>
+                      <a:prstDash val="solid"/>
+                      <a:round/>
+                      <a:headEnd type="none" w="med" len="med"/>
+                      <a:tailEnd type="none" w="med" len="med"/>
+                    </a:lnT>
+                    <a:lnB w="12700" cap="flat" cmpd="sng" algn="ctr">
+                      <a:solidFill>
+                        <a:srgbClr val="000000"/>
+                      </a:solidFill>
+                      <a:prstDash val="solid"/>
+                      <a:round/>
+                      <a:headEnd type="none" w="med" len="med"/>
+                      <a:tailEnd type="none" w="med" len="med"/>
+                    </a:lnB>
+                  </a:tcPr>
+                </a:tc>
+                <a:tc>
+                  <a:txBody>
+                    <a:bodyPr/>
+                    <a:lstStyle/>
+                    <a:p>
+                      <a:pPr algn="l" fontAlgn="t">
+                        <a:lnSpc>
+                          <a:spcPct val="107000"/>
+                        </a:lnSpc>
+                        <a:spcBef>
+                          <a:spcPts val="0"/>
+                        </a:spcBef>
+                        <a:spcAft>
+                          <a:spcPts val="800"/>
+                        </a:spcAft>
+                      </a:pPr>
+                      <a:r>
+                        <a:rPr lang="de-DE" sz="1600" b="0" i="0" u="none" strike="noStrike">
+                          <a:effectLst/>
+                          <a:latin typeface="Calibri" panose="020F0502020204030204" pitchFamily="34" charset="0"/>
+                          <a:ea typeface="Calibri" panose="020F0502020204030204" pitchFamily="34" charset="0"/>
+                          <a:cs typeface="Times New Roman" panose="02020603050405020304" pitchFamily="18" charset="0"/>
+                        </a:rPr>
+                        <a:t>Frühes Ausprobieren von Teilsystemen</a:t>
+                      </a:r>
+                      <a:endParaRPr lang="de-DE" sz="2900" b="0" i="0" u="none" strike="noStrike">
+                        <a:effectLst/>
+                        <a:latin typeface="Arial" panose="020B0604020202020204" pitchFamily="34" charset="0"/>
+                      </a:endParaRPr>
+                    </a:p>
+                  </a:txBody>
+                  <a:tcPr marL="108842" marR="108842" marT="15117" marB="0">
+                    <a:lnL w="12700" cap="flat" cmpd="sng" algn="ctr">
+                      <a:solidFill>
+                        <a:srgbClr val="000000"/>
+                      </a:solidFill>
+                      <a:prstDash val="solid"/>
+                      <a:round/>
+                      <a:headEnd type="none" w="med" len="med"/>
+                      <a:tailEnd type="none" w="med" len="med"/>
+                    </a:lnL>
+                    <a:lnR w="12700" cap="flat" cmpd="sng" algn="ctr">
+                      <a:solidFill>
+                        <a:srgbClr val="000000"/>
+                      </a:solidFill>
+                      <a:prstDash val="solid"/>
+                      <a:round/>
+                      <a:headEnd type="none" w="med" len="med"/>
+                      <a:tailEnd type="none" w="med" len="med"/>
+                    </a:lnR>
+                    <a:lnT w="12700" cap="flat" cmpd="sng" algn="ctr">
+                      <a:solidFill>
+                        <a:srgbClr val="000000"/>
+                      </a:solidFill>
+                      <a:prstDash val="solid"/>
+                      <a:round/>
+                      <a:headEnd type="none" w="med" len="med"/>
+                      <a:tailEnd type="none" w="med" len="med"/>
+                    </a:lnT>
+                    <a:lnB w="12700" cap="flat" cmpd="sng" algn="ctr">
+                      <a:solidFill>
+                        <a:srgbClr val="000000"/>
+                      </a:solidFill>
+                      <a:prstDash val="solid"/>
+                      <a:round/>
+                      <a:headEnd type="none" w="med" len="med"/>
+                      <a:tailEnd type="none" w="med" len="med"/>
+                    </a:lnB>
+                  </a:tcPr>
+                </a:tc>
+                <a:tc>
+                  <a:txBody>
+                    <a:bodyPr/>
+                    <a:lstStyle/>
+                    <a:p>
+                      <a:pPr algn="l" fontAlgn="t">
+                        <a:lnSpc>
+                          <a:spcPct val="107000"/>
+                        </a:lnSpc>
+                        <a:spcBef>
+                          <a:spcPts val="0"/>
+                        </a:spcBef>
+                        <a:spcAft>
+                          <a:spcPts val="800"/>
+                        </a:spcAft>
+                      </a:pPr>
+                      <a:r>
+                        <a:rPr lang="de-DE" sz="1600" b="0" i="0" u="none" strike="noStrike">
+                          <a:effectLst/>
+                          <a:latin typeface="Calibri" panose="020F0502020204030204" pitchFamily="34" charset="0"/>
+                          <a:ea typeface="Calibri" panose="020F0502020204030204" pitchFamily="34" charset="0"/>
+                          <a:cs typeface="Times New Roman" panose="02020603050405020304" pitchFamily="18" charset="0"/>
+                        </a:rPr>
+                        <a:t> </a:t>
+                      </a:r>
+                      <a:endParaRPr lang="de-DE" sz="2900" b="0" i="0" u="none" strike="noStrike">
+                        <a:effectLst/>
+                        <a:latin typeface="Arial" panose="020B0604020202020204" pitchFamily="34" charset="0"/>
+                      </a:endParaRPr>
+                    </a:p>
+                  </a:txBody>
+                  <a:tcPr marL="108842" marR="108842" marT="15117" marB="0">
+                    <a:lnL w="12700" cap="flat" cmpd="sng" algn="ctr">
+                      <a:solidFill>
+                        <a:srgbClr val="000000"/>
+                      </a:solidFill>
+                      <a:prstDash val="solid"/>
+                      <a:round/>
+                      <a:headEnd type="none" w="med" len="med"/>
+                      <a:tailEnd type="none" w="med" len="med"/>
+                    </a:lnL>
+                    <a:lnR w="12700" cap="flat" cmpd="sng" algn="ctr">
+                      <a:solidFill>
+                        <a:srgbClr val="000000"/>
+                      </a:solidFill>
+                      <a:prstDash val="solid"/>
+                      <a:round/>
+                      <a:headEnd type="none" w="med" len="med"/>
+                      <a:tailEnd type="none" w="med" len="med"/>
+                    </a:lnR>
+                    <a:lnT w="12700" cap="flat" cmpd="sng" algn="ctr">
+                      <a:solidFill>
+                        <a:srgbClr val="000000"/>
+                      </a:solidFill>
+                      <a:prstDash val="solid"/>
+                      <a:round/>
+                      <a:headEnd type="none" w="med" len="med"/>
+                      <a:tailEnd type="none" w="med" len="med"/>
+                    </a:lnT>
+                    <a:lnB w="12700" cap="flat" cmpd="sng" algn="ctr">
+                      <a:solidFill>
+                        <a:srgbClr val="000000"/>
+                      </a:solidFill>
+                      <a:prstDash val="solid"/>
+                      <a:round/>
+                      <a:headEnd type="none" w="med" len="med"/>
+                      <a:tailEnd type="none" w="med" len="med"/>
+                    </a:lnB>
+                    <a:solidFill>
+                      <a:srgbClr val="FFC000"/>
+                    </a:solidFill>
+                  </a:tcPr>
+                </a:tc>
+                <a:extLst>
+                  <a:ext uri="{0D108BD9-81ED-4DB2-BD59-A6C34878D82A}">
+                    <a16:rowId xmlns:a16="http://schemas.microsoft.com/office/drawing/2014/main" val="980000272"/>
+                  </a:ext>
+                </a:extLst>
+              </a:tr>
+              <a:tr h="849574">
+                <a:tc>
+                  <a:txBody>
+                    <a:bodyPr/>
+                    <a:lstStyle/>
+                    <a:p>
+                      <a:pPr algn="l" fontAlgn="t">
+                        <a:lnSpc>
+                          <a:spcPct val="107000"/>
+                        </a:lnSpc>
+                        <a:spcBef>
+                          <a:spcPts val="0"/>
+                        </a:spcBef>
+                        <a:spcAft>
+                          <a:spcPts val="800"/>
+                        </a:spcAft>
+                      </a:pPr>
+                      <a:r>
+                        <a:rPr lang="de-DE" sz="1600" b="0" i="0" u="none" strike="noStrike">
+                          <a:effectLst/>
+                          <a:latin typeface="Calibri" panose="020F0502020204030204" pitchFamily="34" charset="0"/>
+                          <a:ea typeface="Calibri" panose="020F0502020204030204" pitchFamily="34" charset="0"/>
+                          <a:cs typeface="Times New Roman" panose="02020603050405020304" pitchFamily="18" charset="0"/>
+                        </a:rPr>
+                        <a:t>Produkt nicht Wasserdicht</a:t>
+                      </a:r>
+                      <a:endParaRPr lang="de-DE" sz="2900" b="0" i="0" u="none" strike="noStrike">
+                        <a:effectLst/>
+                        <a:latin typeface="Arial" panose="020B0604020202020204" pitchFamily="34" charset="0"/>
+                      </a:endParaRPr>
+                    </a:p>
+                  </a:txBody>
+                  <a:tcPr marL="108842" marR="108842" marT="15117" marB="0">
+                    <a:lnL w="12700" cap="flat" cmpd="sng" algn="ctr">
+                      <a:solidFill>
+                        <a:srgbClr val="000000"/>
+                      </a:solidFill>
+                      <a:prstDash val="solid"/>
+                      <a:round/>
+                      <a:headEnd type="none" w="med" len="med"/>
+                      <a:tailEnd type="none" w="med" len="med"/>
+                    </a:lnL>
+                    <a:lnR w="12700" cap="flat" cmpd="sng" algn="ctr">
+                      <a:solidFill>
+                        <a:srgbClr val="000000"/>
+                      </a:solidFill>
+                      <a:prstDash val="solid"/>
+                      <a:round/>
+                      <a:headEnd type="none" w="med" len="med"/>
+                      <a:tailEnd type="none" w="med" len="med"/>
+                    </a:lnR>
+                    <a:lnT w="12700" cap="flat" cmpd="sng" algn="ctr">
+                      <a:solidFill>
+                        <a:srgbClr val="000000"/>
+                      </a:solidFill>
+                      <a:prstDash val="solid"/>
+                      <a:round/>
+                      <a:headEnd type="none" w="med" len="med"/>
+                      <a:tailEnd type="none" w="med" len="med"/>
+                    </a:lnT>
+                    <a:lnB w="12700" cap="flat" cmpd="sng" algn="ctr">
+                      <a:solidFill>
+                        <a:srgbClr val="000000"/>
+                      </a:solidFill>
+                      <a:prstDash val="solid"/>
+                      <a:round/>
+                      <a:headEnd type="none" w="med" len="med"/>
+                      <a:tailEnd type="none" w="med" len="med"/>
+                    </a:lnB>
+                  </a:tcPr>
+                </a:tc>
+                <a:tc>
+                  <a:txBody>
+                    <a:bodyPr/>
+                    <a:lstStyle/>
+                    <a:p>
+                      <a:pPr algn="l" fontAlgn="t">
+                        <a:lnSpc>
+                          <a:spcPct val="107000"/>
+                        </a:lnSpc>
+                        <a:spcBef>
+                          <a:spcPts val="0"/>
+                        </a:spcBef>
+                        <a:spcAft>
+                          <a:spcPts val="800"/>
+                        </a:spcAft>
+                      </a:pPr>
+                      <a:r>
+                        <a:rPr lang="de-DE" sz="1600" b="0" i="0" u="none" strike="noStrike">
+                          <a:effectLst/>
+                          <a:latin typeface="Calibri" panose="020F0502020204030204" pitchFamily="34" charset="0"/>
+                          <a:ea typeface="Calibri" panose="020F0502020204030204" pitchFamily="34" charset="0"/>
+                          <a:cs typeface="Times New Roman" panose="02020603050405020304" pitchFamily="18" charset="0"/>
+                        </a:rPr>
+                        <a:t>Dichtungen, Gehäuse</a:t>
+                      </a:r>
+                      <a:endParaRPr lang="de-DE" sz="2900" b="0" i="0" u="none" strike="noStrike">
+                        <a:effectLst/>
+                        <a:latin typeface="Arial" panose="020B0604020202020204" pitchFamily="34" charset="0"/>
+                      </a:endParaRPr>
+                    </a:p>
+                  </a:txBody>
+                  <a:tcPr marL="108842" marR="108842" marT="15117" marB="0">
+                    <a:lnL w="12700" cap="flat" cmpd="sng" algn="ctr">
+                      <a:solidFill>
+                        <a:srgbClr val="000000"/>
+                      </a:solidFill>
+                      <a:prstDash val="solid"/>
+                      <a:round/>
+                      <a:headEnd type="none" w="med" len="med"/>
+                      <a:tailEnd type="none" w="med" len="med"/>
+                    </a:lnL>
+                    <a:lnR w="12700" cap="flat" cmpd="sng" algn="ctr">
+                      <a:solidFill>
+                        <a:srgbClr val="000000"/>
+                      </a:solidFill>
+                      <a:prstDash val="solid"/>
+                      <a:round/>
+                      <a:headEnd type="none" w="med" len="med"/>
+                      <a:tailEnd type="none" w="med" len="med"/>
+                    </a:lnR>
+                    <a:lnT w="12700" cap="flat" cmpd="sng" algn="ctr">
+                      <a:solidFill>
+                        <a:srgbClr val="000000"/>
+                      </a:solidFill>
+                      <a:prstDash val="solid"/>
+                      <a:round/>
+                      <a:headEnd type="none" w="med" len="med"/>
+                      <a:tailEnd type="none" w="med" len="med"/>
+                    </a:lnT>
+                    <a:lnB w="12700" cap="flat" cmpd="sng" algn="ctr">
+                      <a:solidFill>
+                        <a:srgbClr val="000000"/>
+                      </a:solidFill>
+                      <a:prstDash val="solid"/>
+                      <a:round/>
+                      <a:headEnd type="none" w="med" len="med"/>
+                      <a:tailEnd type="none" w="med" len="med"/>
+                    </a:lnB>
+                  </a:tcPr>
+                </a:tc>
+                <a:tc>
+                  <a:txBody>
+                    <a:bodyPr/>
+                    <a:lstStyle/>
+                    <a:p>
+                      <a:pPr algn="l" fontAlgn="t">
+                        <a:lnSpc>
+                          <a:spcPct val="107000"/>
+                        </a:lnSpc>
+                        <a:spcBef>
+                          <a:spcPts val="0"/>
+                        </a:spcBef>
+                        <a:spcAft>
+                          <a:spcPts val="800"/>
+                        </a:spcAft>
+                      </a:pPr>
+                      <a:r>
+                        <a:rPr lang="de-DE" sz="1600" b="0" i="0" u="none" strike="noStrike">
+                          <a:effectLst/>
+                          <a:latin typeface="Calibri" panose="020F0502020204030204" pitchFamily="34" charset="0"/>
+                          <a:ea typeface="Calibri" panose="020F0502020204030204" pitchFamily="34" charset="0"/>
+                          <a:cs typeface="Times New Roman" panose="02020603050405020304" pitchFamily="18" charset="0"/>
+                        </a:rPr>
+                        <a:t>Frühzeitiges erkennen von Problembereichen des Gehäuses</a:t>
+                      </a:r>
+                      <a:endParaRPr lang="de-DE" sz="2900" b="0" i="0" u="none" strike="noStrike">
+                        <a:effectLst/>
+                        <a:latin typeface="Arial" panose="020B0604020202020204" pitchFamily="34" charset="0"/>
+                      </a:endParaRPr>
+                    </a:p>
+                  </a:txBody>
+                  <a:tcPr marL="108842" marR="108842" marT="15117" marB="0">
+                    <a:lnL w="12700" cap="flat" cmpd="sng" algn="ctr">
+                      <a:solidFill>
+                        <a:srgbClr val="000000"/>
+                      </a:solidFill>
+                      <a:prstDash val="solid"/>
+                      <a:round/>
+                      <a:headEnd type="none" w="med" len="med"/>
+                      <a:tailEnd type="none" w="med" len="med"/>
+                    </a:lnL>
+                    <a:lnR w="12700" cap="flat" cmpd="sng" algn="ctr">
+                      <a:solidFill>
+                        <a:srgbClr val="000000"/>
+                      </a:solidFill>
+                      <a:prstDash val="solid"/>
+                      <a:round/>
+                      <a:headEnd type="none" w="med" len="med"/>
+                      <a:tailEnd type="none" w="med" len="med"/>
+                    </a:lnR>
+                    <a:lnT w="12700" cap="flat" cmpd="sng" algn="ctr">
+                      <a:solidFill>
+                        <a:srgbClr val="000000"/>
+                      </a:solidFill>
+                      <a:prstDash val="solid"/>
+                      <a:round/>
+                      <a:headEnd type="none" w="med" len="med"/>
+                      <a:tailEnd type="none" w="med" len="med"/>
+                    </a:lnT>
+                    <a:lnB w="12700" cap="flat" cmpd="sng" algn="ctr">
+                      <a:solidFill>
+                        <a:srgbClr val="000000"/>
+                      </a:solidFill>
+                      <a:prstDash val="solid"/>
+                      <a:round/>
+                      <a:headEnd type="none" w="med" len="med"/>
+                      <a:tailEnd type="none" w="med" len="med"/>
+                    </a:lnB>
+                  </a:tcPr>
+                </a:tc>
+                <a:tc>
+                  <a:txBody>
+                    <a:bodyPr/>
+                    <a:lstStyle/>
+                    <a:p>
+                      <a:pPr algn="l" fontAlgn="t">
+                        <a:lnSpc>
+                          <a:spcPct val="107000"/>
+                        </a:lnSpc>
+                        <a:spcBef>
+                          <a:spcPts val="0"/>
+                        </a:spcBef>
+                        <a:spcAft>
+                          <a:spcPts val="800"/>
+                        </a:spcAft>
+                      </a:pPr>
+                      <a:r>
+                        <a:rPr lang="de-DE" sz="1600" b="0" i="0" u="none" strike="noStrike">
+                          <a:effectLst/>
+                          <a:latin typeface="Calibri" panose="020F0502020204030204" pitchFamily="34" charset="0"/>
+                          <a:ea typeface="Calibri" panose="020F0502020204030204" pitchFamily="34" charset="0"/>
+                          <a:cs typeface="Times New Roman" panose="02020603050405020304" pitchFamily="18" charset="0"/>
+                        </a:rPr>
+                        <a:t> </a:t>
+                      </a:r>
+                      <a:endParaRPr lang="de-DE" sz="2900" b="0" i="0" u="none" strike="noStrike">
+                        <a:effectLst/>
+                        <a:latin typeface="Arial" panose="020B0604020202020204" pitchFamily="34" charset="0"/>
+                      </a:endParaRPr>
+                    </a:p>
+                  </a:txBody>
+                  <a:tcPr marL="108842" marR="108842" marT="15117" marB="0">
+                    <a:lnL w="12700" cap="flat" cmpd="sng" algn="ctr">
+                      <a:solidFill>
+                        <a:srgbClr val="000000"/>
+                      </a:solidFill>
+                      <a:prstDash val="solid"/>
+                      <a:round/>
+                      <a:headEnd type="none" w="med" len="med"/>
+                      <a:tailEnd type="none" w="med" len="med"/>
+                    </a:lnL>
+                    <a:lnR w="12700" cap="flat" cmpd="sng" algn="ctr">
+                      <a:solidFill>
+                        <a:srgbClr val="000000"/>
+                      </a:solidFill>
+                      <a:prstDash val="solid"/>
+                      <a:round/>
+                      <a:headEnd type="none" w="med" len="med"/>
+                      <a:tailEnd type="none" w="med" len="med"/>
+                    </a:lnR>
+                    <a:lnT w="12700" cap="flat" cmpd="sng" algn="ctr">
+                      <a:solidFill>
+                        <a:srgbClr val="000000"/>
+                      </a:solidFill>
+                      <a:prstDash val="solid"/>
+                      <a:round/>
+                      <a:headEnd type="none" w="med" len="med"/>
+                      <a:tailEnd type="none" w="med" len="med"/>
+                    </a:lnT>
+                    <a:lnB w="12700" cap="flat" cmpd="sng" algn="ctr">
+                      <a:solidFill>
+                        <a:srgbClr val="000000"/>
+                      </a:solidFill>
+                      <a:prstDash val="solid"/>
+                      <a:round/>
+                      <a:headEnd type="none" w="med" len="med"/>
+                      <a:tailEnd type="none" w="med" len="med"/>
+                    </a:lnB>
+                    <a:solidFill>
+                      <a:srgbClr val="FFFF00"/>
+                    </a:solidFill>
+                  </a:tcPr>
+                </a:tc>
+                <a:extLst>
+                  <a:ext uri="{0D108BD9-81ED-4DB2-BD59-A6C34878D82A}">
+                    <a16:rowId xmlns:a16="http://schemas.microsoft.com/office/drawing/2014/main" val="4247356537"/>
+                  </a:ext>
+                </a:extLst>
+              </a:tr>
+              <a:tr h="849574">
+                <a:tc>
+                  <a:txBody>
+                    <a:bodyPr/>
+                    <a:lstStyle/>
+                    <a:p>
+                      <a:pPr algn="l" fontAlgn="t">
+                        <a:lnSpc>
+                          <a:spcPct val="107000"/>
+                        </a:lnSpc>
+                        <a:spcBef>
+                          <a:spcPts val="0"/>
+                        </a:spcBef>
+                        <a:spcAft>
+                          <a:spcPts val="800"/>
+                        </a:spcAft>
+                      </a:pPr>
+                      <a:r>
+                        <a:rPr lang="de-DE" sz="1600" b="0" i="0" u="none" strike="noStrike">
+                          <a:effectLst/>
+                          <a:latin typeface="Calibri" panose="020F0502020204030204" pitchFamily="34" charset="0"/>
+                          <a:ea typeface="Calibri" panose="020F0502020204030204" pitchFamily="34" charset="0"/>
+                          <a:cs typeface="Times New Roman" panose="02020603050405020304" pitchFamily="18" charset="0"/>
+                        </a:rPr>
+                        <a:t>Nichterfüllen von Anforderungen</a:t>
+                      </a:r>
+                      <a:endParaRPr lang="de-DE" sz="2900" b="0" i="0" u="none" strike="noStrike">
+                        <a:effectLst/>
+                        <a:latin typeface="Arial" panose="020B0604020202020204" pitchFamily="34" charset="0"/>
+                      </a:endParaRPr>
+                    </a:p>
+                  </a:txBody>
+                  <a:tcPr marL="108842" marR="108842" marT="15117" marB="0">
+                    <a:lnL w="12700" cap="flat" cmpd="sng" algn="ctr">
+                      <a:solidFill>
+                        <a:srgbClr val="000000"/>
+                      </a:solidFill>
+                      <a:prstDash val="solid"/>
+                      <a:round/>
+                      <a:headEnd type="none" w="med" len="med"/>
+                      <a:tailEnd type="none" w="med" len="med"/>
+                    </a:lnL>
+                    <a:lnR w="12700" cap="flat" cmpd="sng" algn="ctr">
+                      <a:solidFill>
+                        <a:srgbClr val="000000"/>
+                      </a:solidFill>
+                      <a:prstDash val="solid"/>
+                      <a:round/>
+                      <a:headEnd type="none" w="med" len="med"/>
+                      <a:tailEnd type="none" w="med" len="med"/>
+                    </a:lnR>
+                    <a:lnT w="12700" cap="flat" cmpd="sng" algn="ctr">
+                      <a:solidFill>
+                        <a:srgbClr val="000000"/>
+                      </a:solidFill>
+                      <a:prstDash val="solid"/>
+                      <a:round/>
+                      <a:headEnd type="none" w="med" len="med"/>
+                      <a:tailEnd type="none" w="med" len="med"/>
+                    </a:lnT>
+                    <a:lnB w="12700" cap="flat" cmpd="sng" algn="ctr">
+                      <a:solidFill>
+                        <a:srgbClr val="000000"/>
+                      </a:solidFill>
+                      <a:prstDash val="solid"/>
+                      <a:round/>
+                      <a:headEnd type="none" w="med" len="med"/>
+                      <a:tailEnd type="none" w="med" len="med"/>
+                    </a:lnB>
+                  </a:tcPr>
+                </a:tc>
+                <a:tc>
+                  <a:txBody>
+                    <a:bodyPr/>
+                    <a:lstStyle/>
+                    <a:p>
+                      <a:pPr algn="l" fontAlgn="t">
+                        <a:lnSpc>
+                          <a:spcPct val="107000"/>
+                        </a:lnSpc>
+                        <a:spcBef>
+                          <a:spcPts val="0"/>
+                        </a:spcBef>
+                        <a:spcAft>
+                          <a:spcPts val="800"/>
+                        </a:spcAft>
+                      </a:pPr>
+                      <a:r>
+                        <a:rPr lang="de-DE" sz="1600" b="0" i="0" u="none" strike="noStrike">
+                          <a:effectLst/>
+                          <a:latin typeface="Calibri" panose="020F0502020204030204" pitchFamily="34" charset="0"/>
+                          <a:ea typeface="Calibri" panose="020F0502020204030204" pitchFamily="34" charset="0"/>
+                          <a:cs typeface="Times New Roman" panose="02020603050405020304" pitchFamily="18" charset="0"/>
+                        </a:rPr>
+                        <a:t>Kompetenz, Hohe Ansprüche des Kunden, Hohe Ansprüche an sich</a:t>
+                      </a:r>
+                      <a:endParaRPr lang="de-DE" sz="2900" b="0" i="0" u="none" strike="noStrike">
+                        <a:effectLst/>
+                        <a:latin typeface="Arial" panose="020B0604020202020204" pitchFamily="34" charset="0"/>
+                      </a:endParaRPr>
+                    </a:p>
+                  </a:txBody>
+                  <a:tcPr marL="108842" marR="108842" marT="15117" marB="0">
+                    <a:lnL w="12700" cap="flat" cmpd="sng" algn="ctr">
+                      <a:solidFill>
+                        <a:srgbClr val="000000"/>
+                      </a:solidFill>
+                      <a:prstDash val="solid"/>
+                      <a:round/>
+                      <a:headEnd type="none" w="med" len="med"/>
+                      <a:tailEnd type="none" w="med" len="med"/>
+                    </a:lnL>
+                    <a:lnR w="12700" cap="flat" cmpd="sng" algn="ctr">
+                      <a:solidFill>
+                        <a:srgbClr val="000000"/>
+                      </a:solidFill>
+                      <a:prstDash val="solid"/>
+                      <a:round/>
+                      <a:headEnd type="none" w="med" len="med"/>
+                      <a:tailEnd type="none" w="med" len="med"/>
+                    </a:lnR>
+                    <a:lnT w="12700" cap="flat" cmpd="sng" algn="ctr">
+                      <a:solidFill>
+                        <a:srgbClr val="000000"/>
+                      </a:solidFill>
+                      <a:prstDash val="solid"/>
+                      <a:round/>
+                      <a:headEnd type="none" w="med" len="med"/>
+                      <a:tailEnd type="none" w="med" len="med"/>
+                    </a:lnT>
+                    <a:lnB w="12700" cap="flat" cmpd="sng" algn="ctr">
+                      <a:solidFill>
+                        <a:srgbClr val="000000"/>
+                      </a:solidFill>
+                      <a:prstDash val="solid"/>
+                      <a:round/>
+                      <a:headEnd type="none" w="med" len="med"/>
+                      <a:tailEnd type="none" w="med" len="med"/>
+                    </a:lnB>
+                  </a:tcPr>
+                </a:tc>
+                <a:tc>
+                  <a:txBody>
+                    <a:bodyPr/>
+                    <a:lstStyle/>
+                    <a:p>
+                      <a:pPr algn="l" fontAlgn="t">
+                        <a:lnSpc>
+                          <a:spcPct val="107000"/>
+                        </a:lnSpc>
+                        <a:spcBef>
+                          <a:spcPts val="0"/>
+                        </a:spcBef>
+                        <a:spcAft>
+                          <a:spcPts val="800"/>
+                        </a:spcAft>
+                      </a:pPr>
+                      <a:r>
+                        <a:rPr lang="de-DE" sz="1600" b="0" i="0" u="none" strike="noStrike">
+                          <a:effectLst/>
+                          <a:latin typeface="Calibri" panose="020F0502020204030204" pitchFamily="34" charset="0"/>
+                          <a:ea typeface="Calibri" panose="020F0502020204030204" pitchFamily="34" charset="0"/>
+                          <a:cs typeface="Times New Roman" panose="02020603050405020304" pitchFamily="18" charset="0"/>
+                        </a:rPr>
+                        <a:t>Einschätzen der eigenen Kapazitäten, Anforderungen beurteilen</a:t>
+                      </a:r>
+                      <a:endParaRPr lang="de-DE" sz="2900" b="0" i="0" u="none" strike="noStrike">
+                        <a:effectLst/>
+                        <a:latin typeface="Arial" panose="020B0604020202020204" pitchFamily="34" charset="0"/>
+                      </a:endParaRPr>
+                    </a:p>
+                  </a:txBody>
+                  <a:tcPr marL="108842" marR="108842" marT="15117" marB="0">
+                    <a:lnL w="12700" cap="flat" cmpd="sng" algn="ctr">
+                      <a:solidFill>
+                        <a:srgbClr val="000000"/>
+                      </a:solidFill>
+                      <a:prstDash val="solid"/>
+                      <a:round/>
+                      <a:headEnd type="none" w="med" len="med"/>
+                      <a:tailEnd type="none" w="med" len="med"/>
+                    </a:lnL>
+                    <a:lnR w="12700" cap="flat" cmpd="sng" algn="ctr">
+                      <a:solidFill>
+                        <a:srgbClr val="000000"/>
+                      </a:solidFill>
+                      <a:prstDash val="solid"/>
+                      <a:round/>
+                      <a:headEnd type="none" w="med" len="med"/>
+                      <a:tailEnd type="none" w="med" len="med"/>
+                    </a:lnR>
+                    <a:lnT w="12700" cap="flat" cmpd="sng" algn="ctr">
+                      <a:solidFill>
+                        <a:srgbClr val="000000"/>
+                      </a:solidFill>
+                      <a:prstDash val="solid"/>
+                      <a:round/>
+                      <a:headEnd type="none" w="med" len="med"/>
+                      <a:tailEnd type="none" w="med" len="med"/>
+                    </a:lnT>
+                    <a:lnB w="12700" cap="flat" cmpd="sng" algn="ctr">
+                      <a:solidFill>
+                        <a:srgbClr val="000000"/>
+                      </a:solidFill>
+                      <a:prstDash val="solid"/>
+                      <a:round/>
+                      <a:headEnd type="none" w="med" len="med"/>
+                      <a:tailEnd type="none" w="med" len="med"/>
+                    </a:lnB>
+                  </a:tcPr>
+                </a:tc>
+                <a:tc>
+                  <a:txBody>
+                    <a:bodyPr/>
+                    <a:lstStyle/>
+                    <a:p>
+                      <a:pPr algn="l" fontAlgn="t">
+                        <a:lnSpc>
+                          <a:spcPct val="107000"/>
+                        </a:lnSpc>
+                        <a:spcBef>
+                          <a:spcPts val="0"/>
+                        </a:spcBef>
+                        <a:spcAft>
+                          <a:spcPts val="800"/>
+                        </a:spcAft>
+                      </a:pPr>
+                      <a:r>
+                        <a:rPr lang="de-DE" sz="1600" b="0" i="0" u="none" strike="noStrike">
+                          <a:effectLst/>
+                          <a:latin typeface="Calibri" panose="020F0502020204030204" pitchFamily="34" charset="0"/>
+                          <a:ea typeface="Calibri" panose="020F0502020204030204" pitchFamily="34" charset="0"/>
+                          <a:cs typeface="Times New Roman" panose="02020603050405020304" pitchFamily="18" charset="0"/>
+                        </a:rPr>
+                        <a:t> </a:t>
+                      </a:r>
+                      <a:endParaRPr lang="de-DE" sz="2900" b="0" i="0" u="none" strike="noStrike">
+                        <a:effectLst/>
+                        <a:latin typeface="Arial" panose="020B0604020202020204" pitchFamily="34" charset="0"/>
+                      </a:endParaRPr>
+                    </a:p>
+                  </a:txBody>
+                  <a:tcPr marL="108842" marR="108842" marT="15117" marB="0">
+                    <a:lnL w="12700" cap="flat" cmpd="sng" algn="ctr">
+                      <a:solidFill>
+                        <a:srgbClr val="000000"/>
+                      </a:solidFill>
+                      <a:prstDash val="solid"/>
+                      <a:round/>
+                      <a:headEnd type="none" w="med" len="med"/>
+                      <a:tailEnd type="none" w="med" len="med"/>
+                    </a:lnL>
+                    <a:lnR w="12700" cap="flat" cmpd="sng" algn="ctr">
+                      <a:solidFill>
+                        <a:srgbClr val="000000"/>
+                      </a:solidFill>
+                      <a:prstDash val="solid"/>
+                      <a:round/>
+                      <a:headEnd type="none" w="med" len="med"/>
+                      <a:tailEnd type="none" w="med" len="med"/>
+                    </a:lnR>
+                    <a:lnT w="12700" cap="flat" cmpd="sng" algn="ctr">
+                      <a:solidFill>
+                        <a:srgbClr val="000000"/>
+                      </a:solidFill>
+                      <a:prstDash val="solid"/>
+                      <a:round/>
+                      <a:headEnd type="none" w="med" len="med"/>
+                      <a:tailEnd type="none" w="med" len="med"/>
+                    </a:lnT>
+                    <a:lnB w="12700" cap="flat" cmpd="sng" algn="ctr">
+                      <a:solidFill>
+                        <a:srgbClr val="000000"/>
+                      </a:solidFill>
+                      <a:prstDash val="solid"/>
+                      <a:round/>
+                      <a:headEnd type="none" w="med" len="med"/>
+                      <a:tailEnd type="none" w="med" len="med"/>
+                    </a:lnB>
+                    <a:solidFill>
+                      <a:srgbClr val="FFFF00"/>
+                    </a:solidFill>
+                  </a:tcPr>
+                </a:tc>
+                <a:extLst>
+                  <a:ext uri="{0D108BD9-81ED-4DB2-BD59-A6C34878D82A}">
+                    <a16:rowId xmlns:a16="http://schemas.microsoft.com/office/drawing/2014/main" val="910479461"/>
+                  </a:ext>
+                </a:extLst>
+              </a:tr>
+              <a:tr h="849574">
+                <a:tc>
+                  <a:txBody>
+                    <a:bodyPr/>
+                    <a:lstStyle/>
+                    <a:p>
+                      <a:pPr algn="l" fontAlgn="t">
+                        <a:lnSpc>
+                          <a:spcPct val="107000"/>
+                        </a:lnSpc>
+                        <a:spcBef>
+                          <a:spcPts val="0"/>
+                        </a:spcBef>
+                        <a:spcAft>
+                          <a:spcPts val="800"/>
+                        </a:spcAft>
+                      </a:pPr>
+                      <a:r>
+                        <a:rPr lang="de-DE" sz="1600" b="0" i="0" u="none" strike="noStrike">
+                          <a:effectLst/>
+                          <a:latin typeface="Calibri" panose="020F0502020204030204" pitchFamily="34" charset="0"/>
+                          <a:ea typeface="Calibri" panose="020F0502020204030204" pitchFamily="34" charset="0"/>
+                          <a:cs typeface="Times New Roman" panose="02020603050405020304" pitchFamily="18" charset="0"/>
+                        </a:rPr>
+                        <a:t>Arbeitsphasen zu früh oder zu spät beendet</a:t>
+                      </a:r>
+                      <a:endParaRPr lang="de-DE" sz="2900" b="0" i="0" u="none" strike="noStrike">
+                        <a:effectLst/>
+                        <a:latin typeface="Arial" panose="020B0604020202020204" pitchFamily="34" charset="0"/>
+                      </a:endParaRPr>
+                    </a:p>
+                  </a:txBody>
+                  <a:tcPr marL="108842" marR="108842" marT="15117" marB="0">
+                    <a:lnL w="12700" cap="flat" cmpd="sng" algn="ctr">
+                      <a:solidFill>
+                        <a:srgbClr val="000000"/>
+                      </a:solidFill>
+                      <a:prstDash val="solid"/>
+                      <a:round/>
+                      <a:headEnd type="none" w="med" len="med"/>
+                      <a:tailEnd type="none" w="med" len="med"/>
+                    </a:lnL>
+                    <a:lnR w="12700" cap="flat" cmpd="sng" algn="ctr">
+                      <a:solidFill>
+                        <a:srgbClr val="000000"/>
+                      </a:solidFill>
+                      <a:prstDash val="solid"/>
+                      <a:round/>
+                      <a:headEnd type="none" w="med" len="med"/>
+                      <a:tailEnd type="none" w="med" len="med"/>
+                    </a:lnR>
+                    <a:lnT w="12700" cap="flat" cmpd="sng" algn="ctr">
+                      <a:solidFill>
+                        <a:srgbClr val="000000"/>
+                      </a:solidFill>
+                      <a:prstDash val="solid"/>
+                      <a:round/>
+                      <a:headEnd type="none" w="med" len="med"/>
+                      <a:tailEnd type="none" w="med" len="med"/>
+                    </a:lnT>
+                    <a:lnB w="12700" cap="flat" cmpd="sng" algn="ctr">
+                      <a:solidFill>
+                        <a:srgbClr val="000000"/>
+                      </a:solidFill>
+                      <a:prstDash val="solid"/>
+                      <a:round/>
+                      <a:headEnd type="none" w="med" len="med"/>
+                      <a:tailEnd type="none" w="med" len="med"/>
+                    </a:lnB>
+                  </a:tcPr>
+                </a:tc>
+                <a:tc>
+                  <a:txBody>
+                    <a:bodyPr/>
+                    <a:lstStyle/>
+                    <a:p>
+                      <a:pPr algn="l" fontAlgn="t">
+                        <a:lnSpc>
+                          <a:spcPct val="107000"/>
+                        </a:lnSpc>
+                        <a:spcBef>
+                          <a:spcPts val="0"/>
+                        </a:spcBef>
+                        <a:spcAft>
+                          <a:spcPts val="800"/>
+                        </a:spcAft>
+                      </a:pPr>
+                      <a:r>
+                        <a:rPr lang="de-DE" sz="1600" b="0" i="0" u="none" strike="noStrike">
+                          <a:effectLst/>
+                          <a:latin typeface="Calibri" panose="020F0502020204030204" pitchFamily="34" charset="0"/>
+                          <a:ea typeface="Calibri" panose="020F0502020204030204" pitchFamily="34" charset="0"/>
+                          <a:cs typeface="Times New Roman" panose="02020603050405020304" pitchFamily="18" charset="0"/>
+                        </a:rPr>
+                        <a:t>Falsches Zeitmanagement, Zu Viel oder zu Wenig Arbeit</a:t>
+                      </a:r>
+                      <a:endParaRPr lang="de-DE" sz="2900" b="0" i="0" u="none" strike="noStrike">
+                        <a:effectLst/>
+                        <a:latin typeface="Arial" panose="020B0604020202020204" pitchFamily="34" charset="0"/>
+                      </a:endParaRPr>
+                    </a:p>
+                  </a:txBody>
+                  <a:tcPr marL="108842" marR="108842" marT="15117" marB="0">
+                    <a:lnL w="12700" cap="flat" cmpd="sng" algn="ctr">
+                      <a:solidFill>
+                        <a:srgbClr val="000000"/>
+                      </a:solidFill>
+                      <a:prstDash val="solid"/>
+                      <a:round/>
+                      <a:headEnd type="none" w="med" len="med"/>
+                      <a:tailEnd type="none" w="med" len="med"/>
+                    </a:lnL>
+                    <a:lnR w="12700" cap="flat" cmpd="sng" algn="ctr">
+                      <a:solidFill>
+                        <a:srgbClr val="000000"/>
+                      </a:solidFill>
+                      <a:prstDash val="solid"/>
+                      <a:round/>
+                      <a:headEnd type="none" w="med" len="med"/>
+                      <a:tailEnd type="none" w="med" len="med"/>
+                    </a:lnR>
+                    <a:lnT w="12700" cap="flat" cmpd="sng" algn="ctr">
+                      <a:solidFill>
+                        <a:srgbClr val="000000"/>
+                      </a:solidFill>
+                      <a:prstDash val="solid"/>
+                      <a:round/>
+                      <a:headEnd type="none" w="med" len="med"/>
+                      <a:tailEnd type="none" w="med" len="med"/>
+                    </a:lnT>
+                    <a:lnB w="12700" cap="flat" cmpd="sng" algn="ctr">
+                      <a:solidFill>
+                        <a:srgbClr val="000000"/>
+                      </a:solidFill>
+                      <a:prstDash val="solid"/>
+                      <a:round/>
+                      <a:headEnd type="none" w="med" len="med"/>
+                      <a:tailEnd type="none" w="med" len="med"/>
+                    </a:lnB>
+                  </a:tcPr>
+                </a:tc>
+                <a:tc>
+                  <a:txBody>
+                    <a:bodyPr/>
+                    <a:lstStyle/>
+                    <a:p>
+                      <a:pPr algn="l" fontAlgn="t">
+                        <a:lnSpc>
+                          <a:spcPct val="107000"/>
+                        </a:lnSpc>
+                        <a:spcBef>
+                          <a:spcPts val="0"/>
+                        </a:spcBef>
+                        <a:spcAft>
+                          <a:spcPts val="800"/>
+                        </a:spcAft>
+                      </a:pPr>
+                      <a:r>
+                        <a:rPr lang="de-DE" sz="1600" b="0" i="0" u="none" strike="noStrike">
+                          <a:effectLst/>
+                          <a:latin typeface="Calibri" panose="020F0502020204030204" pitchFamily="34" charset="0"/>
+                          <a:ea typeface="Calibri" panose="020F0502020204030204" pitchFamily="34" charset="0"/>
+                          <a:cs typeface="Times New Roman" panose="02020603050405020304" pitchFamily="18" charset="0"/>
+                        </a:rPr>
+                        <a:t>Gut formulierte Ziele, Vernünftiges Aufgabenmanagement</a:t>
+                      </a:r>
+                      <a:endParaRPr lang="de-DE" sz="2900" b="0" i="0" u="none" strike="noStrike">
+                        <a:effectLst/>
+                        <a:latin typeface="Arial" panose="020B0604020202020204" pitchFamily="34" charset="0"/>
+                      </a:endParaRPr>
+                    </a:p>
+                  </a:txBody>
+                  <a:tcPr marL="108842" marR="108842" marT="15117" marB="0">
+                    <a:lnL w="12700" cap="flat" cmpd="sng" algn="ctr">
+                      <a:solidFill>
+                        <a:srgbClr val="000000"/>
+                      </a:solidFill>
+                      <a:prstDash val="solid"/>
+                      <a:round/>
+                      <a:headEnd type="none" w="med" len="med"/>
+                      <a:tailEnd type="none" w="med" len="med"/>
+                    </a:lnL>
+                    <a:lnR w="12700" cap="flat" cmpd="sng" algn="ctr">
+                      <a:solidFill>
+                        <a:srgbClr val="000000"/>
+                      </a:solidFill>
+                      <a:prstDash val="solid"/>
+                      <a:round/>
+                      <a:headEnd type="none" w="med" len="med"/>
+                      <a:tailEnd type="none" w="med" len="med"/>
+                    </a:lnR>
+                    <a:lnT w="12700" cap="flat" cmpd="sng" algn="ctr">
+                      <a:solidFill>
+                        <a:srgbClr val="000000"/>
+                      </a:solidFill>
+                      <a:prstDash val="solid"/>
+                      <a:round/>
+                      <a:headEnd type="none" w="med" len="med"/>
+                      <a:tailEnd type="none" w="med" len="med"/>
+                    </a:lnT>
+                    <a:lnB w="12700" cap="flat" cmpd="sng" algn="ctr">
+                      <a:solidFill>
+                        <a:srgbClr val="000000"/>
+                      </a:solidFill>
+                      <a:prstDash val="solid"/>
+                      <a:round/>
+                      <a:headEnd type="none" w="med" len="med"/>
+                      <a:tailEnd type="none" w="med" len="med"/>
+                    </a:lnB>
+                  </a:tcPr>
+                </a:tc>
+                <a:tc>
+                  <a:txBody>
+                    <a:bodyPr/>
+                    <a:lstStyle/>
+                    <a:p>
+                      <a:pPr algn="l" fontAlgn="t">
+                        <a:lnSpc>
+                          <a:spcPct val="107000"/>
+                        </a:lnSpc>
+                        <a:spcBef>
+                          <a:spcPts val="0"/>
+                        </a:spcBef>
+                        <a:spcAft>
+                          <a:spcPts val="800"/>
+                        </a:spcAft>
+                        <a:tabLst>
+                          <a:tab pos="374650" algn="l"/>
+                        </a:tabLst>
+                      </a:pPr>
+                      <a:r>
+                        <a:rPr lang="de-DE" sz="1600" b="0" i="0" u="none" strike="noStrike" dirty="0">
+                          <a:solidFill>
+                            <a:srgbClr val="000000"/>
+                          </a:solidFill>
+                          <a:effectLst/>
+                          <a:latin typeface="Calibri" panose="020F0502020204030204" pitchFamily="34" charset="0"/>
+                          <a:ea typeface="Calibri" panose="020F0502020204030204" pitchFamily="34" charset="0"/>
+                          <a:cs typeface="Times New Roman" panose="02020603050405020304" pitchFamily="18" charset="0"/>
+                        </a:rPr>
+                        <a:t>	</a:t>
+                      </a:r>
+                      <a:endParaRPr lang="de-DE" sz="2900" b="0" i="0" u="none" strike="noStrike" dirty="0">
+                        <a:effectLst/>
+                        <a:latin typeface="Arial" panose="020B0604020202020204" pitchFamily="34" charset="0"/>
+                      </a:endParaRPr>
+                    </a:p>
+                  </a:txBody>
+                  <a:tcPr marL="108842" marR="108842" marT="15117" marB="0">
+                    <a:lnL w="12700" cap="flat" cmpd="sng" algn="ctr">
+                      <a:solidFill>
+                        <a:srgbClr val="000000"/>
+                      </a:solidFill>
+                      <a:prstDash val="solid"/>
+                      <a:round/>
+                      <a:headEnd type="none" w="med" len="med"/>
+                      <a:tailEnd type="none" w="med" len="med"/>
+                    </a:lnL>
+                    <a:lnR w="12700" cap="flat" cmpd="sng" algn="ctr">
+                      <a:solidFill>
+                        <a:srgbClr val="000000"/>
+                      </a:solidFill>
+                      <a:prstDash val="solid"/>
+                      <a:round/>
+                      <a:headEnd type="none" w="med" len="med"/>
+                      <a:tailEnd type="none" w="med" len="med"/>
+                    </a:lnR>
+                    <a:lnT w="12700" cap="flat" cmpd="sng" algn="ctr">
+                      <a:solidFill>
+                        <a:srgbClr val="000000"/>
+                      </a:solidFill>
+                      <a:prstDash val="solid"/>
+                      <a:round/>
+                      <a:headEnd type="none" w="med" len="med"/>
+                      <a:tailEnd type="none" w="med" len="med"/>
+                    </a:lnT>
+                    <a:lnB w="12700" cap="flat" cmpd="sng" algn="ctr">
+                      <a:solidFill>
+                        <a:srgbClr val="000000"/>
+                      </a:solidFill>
+                      <a:prstDash val="solid"/>
+                      <a:round/>
+                      <a:headEnd type="none" w="med" len="med"/>
+                      <a:tailEnd type="none" w="med" len="med"/>
+                    </a:lnB>
+                    <a:solidFill>
+                      <a:srgbClr val="00B050"/>
+                    </a:solidFill>
+                  </a:tcPr>
+                </a:tc>
+                <a:extLst>
+                  <a:ext uri="{0D108BD9-81ED-4DB2-BD59-A6C34878D82A}">
+                    <a16:rowId xmlns:a16="http://schemas.microsoft.com/office/drawing/2014/main" val="303453965"/>
+                  </a:ext>
+                </a:extLst>
+              </a:tr>
+            </a:tbl>
+          </a:graphicData>
+        </a:graphic>
+      </p:graphicFrame>
+    </p:spTree>
+    <p:extLst>
+      <p:ext uri="{BB962C8B-B14F-4D97-AF65-F5344CB8AC3E}">
+        <p14:creationId xmlns:p14="http://schemas.microsoft.com/office/powerpoint/2010/main" val="3656380227"/>
       </p:ext>
     </p:extLst>
   </p:cSld>

</xml_diff>

<commit_message>
Final state Status Bericht 1
</commit_message>
<xml_diff>
--- a/20-11-23_Statusbericht/20WiSe-GPM LightingSharks TND v0.1.pptx
+++ b/20-11-23_Statusbericht/20WiSe-GPM LightingSharks TND v0.1.pptx
@@ -5,10 +5,10 @@
     <p:sldMasterId id="2147483648" r:id="rId1"/>
   </p:sldMasterIdLst>
   <p:notesMasterIdLst>
-    <p:notesMasterId r:id="rId12"/>
+    <p:notesMasterId r:id="rId13"/>
   </p:notesMasterIdLst>
   <p:handoutMasterIdLst>
-    <p:handoutMasterId r:id="rId13"/>
+    <p:handoutMasterId r:id="rId14"/>
   </p:handoutMasterIdLst>
   <p:sldIdLst>
     <p:sldId id="256" r:id="rId2"/>
@@ -20,7 +20,8 @@
     <p:sldId id="263" r:id="rId8"/>
     <p:sldId id="264" r:id="rId9"/>
     <p:sldId id="266" r:id="rId10"/>
-    <p:sldId id="267" r:id="rId11"/>
+    <p:sldId id="269" r:id="rId11"/>
+    <p:sldId id="267" r:id="rId12"/>
   </p:sldIdLst>
   <p:sldSz cx="12192000" cy="6858000"/>
   <p:notesSz cx="6858000" cy="9144000"/>
@@ -222,7 +223,14 @@
           </c:marker>
           <c:cat>
             <c:numRef>
-              <c:f>Tabelle1!$1:$1</c:f>
+              <c:extLst>
+                <c:ext xmlns:c15="http://schemas.microsoft.com/office/drawing/2012/chart" uri="{02D57815-91ED-43cb-92C2-25804820EDAC}">
+                  <c15:fullRef>
+                    <c15:sqref>Tabelle1!$1:$1</c15:sqref>
+                  </c15:fullRef>
+                </c:ext>
+              </c:extLst>
+              <c:f>Tabelle1!$B$1:$XFD$1</c:f>
               <c:numCache>
                 <c:formatCode>d\-mmm</c:formatCode>
                 <c:ptCount val="16381"/>
@@ -300,12 +308,19 @@
           </c:cat>
           <c:val>
             <c:numRef>
-              <c:f>Tabelle1!$7:$7</c:f>
+              <c:extLst>
+                <c:ext xmlns:c15="http://schemas.microsoft.com/office/drawing/2012/chart" uri="{02D57815-91ED-43cb-92C2-25804820EDAC}">
+                  <c15:fullRef>
+                    <c15:sqref>Tabelle1!$7:$7</c15:sqref>
+                  </c15:fullRef>
+                </c:ext>
+              </c:extLst>
+              <c:f>Tabelle1!$B$7:$XFD$7</c:f>
               <c:numCache>
                 <c:formatCode>General</c:formatCode>
                 <c:ptCount val="16381"/>
                 <c:pt idx="0">
-                  <c:v>9.25</c:v>
+                  <c:v>7</c:v>
                 </c:pt>
                 <c:pt idx="1">
                   <c:v>9</c:v>
@@ -379,7 +394,7 @@
           <c:smooth val="0"/>
           <c:extLst>
             <c:ext xmlns:c16="http://schemas.microsoft.com/office/drawing/2014/chart" uri="{C3380CC4-5D6E-409C-BE32-E72D297353CC}">
-              <c16:uniqueId val="{00000000-A47B-4C1C-9966-A770814D1B27}"/>
+              <c16:uniqueId val="{00000000-7945-4B9A-8674-BA7FD1AD7C46}"/>
             </c:ext>
           </c:extLst>
         </c:ser>
@@ -403,7 +418,14 @@
           </c:marker>
           <c:cat>
             <c:numRef>
-              <c:f>Tabelle1!$1:$1</c:f>
+              <c:extLst>
+                <c:ext xmlns:c15="http://schemas.microsoft.com/office/drawing/2012/chart" uri="{02D57815-91ED-43cb-92C2-25804820EDAC}">
+                  <c15:fullRef>
+                    <c15:sqref>Tabelle1!$1:$1</c15:sqref>
+                  </c15:fullRef>
+                </c:ext>
+              </c:extLst>
+              <c:f>Tabelle1!$B$1:$XFD$1</c:f>
               <c:numCache>
                 <c:formatCode>d\-mmm</c:formatCode>
                 <c:ptCount val="16381"/>
@@ -481,7 +503,14 @@
           </c:cat>
           <c:val>
             <c:numRef>
-              <c:f>Tabelle1!$14:$14</c:f>
+              <c:extLst>
+                <c:ext xmlns:c15="http://schemas.microsoft.com/office/drawing/2012/chart" uri="{02D57815-91ED-43cb-92C2-25804820EDAC}">
+                  <c15:fullRef>
+                    <c15:sqref>Tabelle1!$14:$14</c15:sqref>
+                  </c15:fullRef>
+                </c:ext>
+              </c:extLst>
+              <c:f>Tabelle1!$B$14:$XFD$14</c:f>
               <c:numCache>
                 <c:formatCode>General</c:formatCode>
                 <c:ptCount val="16381"/>
@@ -560,7 +589,7 @@
           <c:smooth val="0"/>
           <c:extLst>
             <c:ext xmlns:c16="http://schemas.microsoft.com/office/drawing/2014/chart" uri="{C3380CC4-5D6E-409C-BE32-E72D297353CC}">
-              <c16:uniqueId val="{00000001-A47B-4C1C-9966-A770814D1B27}"/>
+              <c16:uniqueId val="{00000001-7945-4B9A-8674-BA7FD1AD7C46}"/>
             </c:ext>
           </c:extLst>
         </c:ser>
@@ -584,7 +613,14 @@
           </c:marker>
           <c:cat>
             <c:numRef>
-              <c:f>Tabelle1!$1:$1</c:f>
+              <c:extLst>
+                <c:ext xmlns:c15="http://schemas.microsoft.com/office/drawing/2012/chart" uri="{02D57815-91ED-43cb-92C2-25804820EDAC}">
+                  <c15:fullRef>
+                    <c15:sqref>Tabelle1!$1:$1</c15:sqref>
+                  </c15:fullRef>
+                </c:ext>
+              </c:extLst>
+              <c:f>Tabelle1!$B$1:$XFD$1</c:f>
               <c:numCache>
                 <c:formatCode>d\-mmm</c:formatCode>
                 <c:ptCount val="16381"/>
@@ -662,7 +698,14 @@
           </c:cat>
           <c:val>
             <c:numRef>
-              <c:f>Tabelle1!$21:$21</c:f>
+              <c:extLst>
+                <c:ext xmlns:c15="http://schemas.microsoft.com/office/drawing/2012/chart" uri="{02D57815-91ED-43cb-92C2-25804820EDAC}">
+                  <c15:fullRef>
+                    <c15:sqref>Tabelle1!$21:$21</c15:sqref>
+                  </c15:fullRef>
+                </c:ext>
+              </c:extLst>
+              <c:f>Tabelle1!$B$21:$XFD$21</c:f>
               <c:numCache>
                 <c:formatCode>General</c:formatCode>
                 <c:ptCount val="16381"/>
@@ -741,7 +784,7 @@
           <c:smooth val="0"/>
           <c:extLst>
             <c:ext xmlns:c16="http://schemas.microsoft.com/office/drawing/2014/chart" uri="{C3380CC4-5D6E-409C-BE32-E72D297353CC}">
-              <c16:uniqueId val="{00000002-A47B-4C1C-9966-A770814D1B27}"/>
+              <c16:uniqueId val="{00000002-7945-4B9A-8674-BA7FD1AD7C46}"/>
             </c:ext>
           </c:extLst>
         </c:ser>
@@ -765,7 +808,14 @@
           </c:marker>
           <c:cat>
             <c:numRef>
-              <c:f>Tabelle1!$1:$1</c:f>
+              <c:extLst>
+                <c:ext xmlns:c15="http://schemas.microsoft.com/office/drawing/2012/chart" uri="{02D57815-91ED-43cb-92C2-25804820EDAC}">
+                  <c15:fullRef>
+                    <c15:sqref>Tabelle1!$1:$1</c15:sqref>
+                  </c15:fullRef>
+                </c:ext>
+              </c:extLst>
+              <c:f>Tabelle1!$B$1:$XFD$1</c:f>
               <c:numCache>
                 <c:formatCode>d\-mmm</c:formatCode>
                 <c:ptCount val="16381"/>
@@ -843,7 +893,14 @@
           </c:cat>
           <c:val>
             <c:numRef>
-              <c:f>Tabelle1!$28:$28</c:f>
+              <c:extLst>
+                <c:ext xmlns:c15="http://schemas.microsoft.com/office/drawing/2012/chart" uri="{02D57815-91ED-43cb-92C2-25804820EDAC}">
+                  <c15:fullRef>
+                    <c15:sqref>Tabelle1!$28:$28</c15:sqref>
+                  </c15:fullRef>
+                </c:ext>
+              </c:extLst>
+              <c:f>Tabelle1!$B$28:$XFD$28</c:f>
               <c:numCache>
                 <c:formatCode>General</c:formatCode>
                 <c:ptCount val="16381"/>
@@ -922,7 +979,7 @@
           <c:smooth val="0"/>
           <c:extLst>
             <c:ext xmlns:c16="http://schemas.microsoft.com/office/drawing/2014/chart" uri="{C3380CC4-5D6E-409C-BE32-E72D297353CC}">
-              <c16:uniqueId val="{00000003-A47B-4C1C-9966-A770814D1B27}"/>
+              <c16:uniqueId val="{00000003-7945-4B9A-8674-BA7FD1AD7C46}"/>
             </c:ext>
           </c:extLst>
         </c:ser>
@@ -6087,6 +6144,262 @@
         <p:spPr>
           <a:xfrm>
             <a:off x="1281887" y="760332"/>
+            <a:ext cx="3226974" cy="769441"/>
+          </a:xfrm>
+          <a:prstGeom prst="rect">
+            <a:avLst/>
+          </a:prstGeom>
+          <a:noFill/>
+        </p:spPr>
+        <p:txBody>
+          <a:bodyPr wrap="none" rtlCol="0">
+            <a:spAutoFit/>
+          </a:bodyPr>
+          <a:lstStyle/>
+          <a:p>
+            <a:r>
+              <a:rPr lang="de-DE" sz="4400" dirty="0"/>
+              <a:t>Risikoanalyse</a:t>
+            </a:r>
+          </a:p>
+        </p:txBody>
+      </p:sp>
+      <p:sp>
+        <p:nvSpPr>
+          <p:cNvPr id="3" name="Textfeld 2">
+            <a:extLst>
+              <a:ext uri="{FF2B5EF4-FFF2-40B4-BE49-F238E27FC236}">
+                <a16:creationId xmlns:a16="http://schemas.microsoft.com/office/drawing/2014/main" id="{05220B2E-62E4-49E9-BD29-FD42A6E6701B}"/>
+              </a:ext>
+            </a:extLst>
+          </p:cNvPr>
+          <p:cNvSpPr txBox="1"/>
+          <p:nvPr/>
+        </p:nvSpPr>
+        <p:spPr>
+          <a:xfrm>
+            <a:off x="1281887" y="1959429"/>
+            <a:ext cx="7960725" cy="2585323"/>
+          </a:xfrm>
+          <a:prstGeom prst="rect">
+            <a:avLst/>
+          </a:prstGeom>
+          <a:noFill/>
+        </p:spPr>
+        <p:txBody>
+          <a:bodyPr wrap="square" rtlCol="0">
+            <a:spAutoFit/>
+          </a:bodyPr>
+          <a:lstStyle/>
+          <a:p>
+            <a:r>
+              <a:rPr lang="de-DE" b="1" dirty="0">
+                <a:latin typeface="Calibri" panose="020F0502020204030204" pitchFamily="34" charset="0"/>
+                <a:ea typeface="Calibri" panose="020F0502020204030204" pitchFamily="34" charset="0"/>
+                <a:cs typeface="Times New Roman" panose="02020603050405020304" pitchFamily="18" charset="0"/>
+              </a:rPr>
+              <a:t>Projekt wird nicht fertig gestellt</a:t>
+            </a:r>
+            <a:r>
+              <a:rPr lang="de-DE" dirty="0">
+                <a:latin typeface="Calibri" panose="020F0502020204030204" pitchFamily="34" charset="0"/>
+                <a:ea typeface="Calibri" panose="020F0502020204030204" pitchFamily="34" charset="0"/>
+                <a:cs typeface="Times New Roman" panose="02020603050405020304" pitchFamily="18" charset="0"/>
+              </a:rPr>
+              <a:t>: Aufgrund von zeitlicher Fehlplanung konnten nicht alle vorhergesehenen Aspekte des Projektes durchgeführt werden. Ursachen können sein, dass der Projektrahmen zu groß gefasst wurde oder technische Komplikationen haben den geforderten Zeitplan gestört.</a:t>
+            </a:r>
+          </a:p>
+          <a:p>
+            <a:endParaRPr lang="de-DE" dirty="0">
+              <a:latin typeface="Calibri" panose="020F0502020204030204" pitchFamily="34" charset="0"/>
+              <a:cs typeface="Times New Roman" panose="02020603050405020304" pitchFamily="18" charset="0"/>
+            </a:endParaRPr>
+          </a:p>
+          <a:p>
+            <a:r>
+              <a:rPr lang="de-DE" b="1" dirty="0">
+                <a:latin typeface="Calibri" panose="020F0502020204030204" pitchFamily="34" charset="0"/>
+                <a:cs typeface="Times New Roman" panose="02020603050405020304" pitchFamily="18" charset="0"/>
+              </a:rPr>
+              <a:t>System misst falsch oder gar nicht: </a:t>
+            </a:r>
+            <a:r>
+              <a:rPr lang="de-DE" dirty="0">
+                <a:latin typeface="Calibri" panose="020F0502020204030204" pitchFamily="34" charset="0"/>
+                <a:cs typeface="Times New Roman" panose="02020603050405020304" pitchFamily="18" charset="0"/>
+              </a:rPr>
+              <a:t>Nachdem es sich bei unserem Projekt um eine Machbarkeitsstudie handelt, wäre </a:t>
+            </a:r>
+            <a:r>
+              <a:rPr lang="de-DE">
+                <a:latin typeface="Calibri" panose="020F0502020204030204" pitchFamily="34" charset="0"/>
+                <a:cs typeface="Times New Roman" panose="02020603050405020304" pitchFamily="18" charset="0"/>
+              </a:rPr>
+              <a:t>eine Fehlmessung </a:t>
+            </a:r>
+            <a:r>
+              <a:rPr lang="de-DE" dirty="0">
+                <a:latin typeface="Calibri" panose="020F0502020204030204" pitchFamily="34" charset="0"/>
+                <a:cs typeface="Times New Roman" panose="02020603050405020304" pitchFamily="18" charset="0"/>
+              </a:rPr>
+              <a:t>zwar ein ungünstiger Ausgang, aber im Rahmen noch vertretbar. </a:t>
+            </a:r>
+            <a:endParaRPr lang="de-DE" b="1" dirty="0">
+              <a:latin typeface="Calibri" panose="020F0502020204030204" pitchFamily="34" charset="0"/>
+              <a:cs typeface="Times New Roman" panose="02020603050405020304" pitchFamily="18" charset="0"/>
+            </a:endParaRPr>
+          </a:p>
+          <a:p>
+            <a:endParaRPr lang="de-DE" dirty="0">
+              <a:latin typeface="Arial" panose="020B0604020202020204" pitchFamily="34" charset="0"/>
+            </a:endParaRPr>
+          </a:p>
+        </p:txBody>
+      </p:sp>
+    </p:spTree>
+    <p:extLst>
+      <p:ext uri="{BB962C8B-B14F-4D97-AF65-F5344CB8AC3E}">
+        <p14:creationId xmlns:p14="http://schemas.microsoft.com/office/powerpoint/2010/main" val="4162896989"/>
+      </p:ext>
+    </p:extLst>
+  </p:cSld>
+  <p:clrMapOvr>
+    <a:masterClrMapping/>
+  </p:clrMapOvr>
+</p:sld>
+</file>
+
+<file path=ppt/slides/slide11.xml><?xml version="1.0" encoding="utf-8"?>
+<p:sld xmlns:a="http://schemas.openxmlformats.org/drawingml/2006/main" xmlns:r="http://schemas.openxmlformats.org/officeDocument/2006/relationships" xmlns:p="http://schemas.openxmlformats.org/presentationml/2006/main">
+  <p:cSld>
+    <p:spTree>
+      <p:nvGrpSpPr>
+        <p:cNvPr id="1" name=""/>
+        <p:cNvGrpSpPr/>
+        <p:nvPr/>
+      </p:nvGrpSpPr>
+      <p:grpSpPr>
+        <a:xfrm>
+          <a:off x="0" y="0"/>
+          <a:ext cx="0" cy="0"/>
+          <a:chOff x="0" y="0"/>
+          <a:chExt cx="0" cy="0"/>
+        </a:xfrm>
+      </p:grpSpPr>
+      <p:sp>
+        <p:nvSpPr>
+          <p:cNvPr id="5" name="Datumsplatzhalter 4">
+            <a:extLst>
+              <a:ext uri="{FF2B5EF4-FFF2-40B4-BE49-F238E27FC236}">
+                <a16:creationId xmlns:a16="http://schemas.microsoft.com/office/drawing/2014/main" id="{02AC242E-056D-4A16-929F-CCEFDAC92688}"/>
+              </a:ext>
+            </a:extLst>
+          </p:cNvPr>
+          <p:cNvSpPr>
+            <a:spLocks noGrp="1"/>
+          </p:cNvSpPr>
+          <p:nvPr>
+            <p:ph type="dt" sz="half" idx="10"/>
+          </p:nvPr>
+        </p:nvSpPr>
+        <p:spPr/>
+        <p:txBody>
+          <a:bodyPr/>
+          <a:lstStyle/>
+          <a:p>
+            <a:fld id="{4C7FBE89-DCA5-4DC0-AB26-3C3EB1D6532B}" type="datetime1">
+              <a:rPr lang="de-DE" smtClean="0"/>
+              <a:t>23.11.2020</a:t>
+            </a:fld>
+            <a:endParaRPr lang="de-DE"/>
+          </a:p>
+        </p:txBody>
+      </p:sp>
+      <p:sp>
+        <p:nvSpPr>
+          <p:cNvPr id="7" name="Foliennummernplatzhalter 6">
+            <a:extLst>
+              <a:ext uri="{FF2B5EF4-FFF2-40B4-BE49-F238E27FC236}">
+                <a16:creationId xmlns:a16="http://schemas.microsoft.com/office/drawing/2014/main" id="{D1C2059F-1072-4A86-9869-7FBD8B5618BD}"/>
+              </a:ext>
+            </a:extLst>
+          </p:cNvPr>
+          <p:cNvSpPr>
+            <a:spLocks noGrp="1"/>
+          </p:cNvSpPr>
+          <p:nvPr>
+            <p:ph type="sldNum" sz="quarter" idx="12"/>
+          </p:nvPr>
+        </p:nvSpPr>
+        <p:spPr>
+          <a:xfrm>
+            <a:off x="8509932" y="6356350"/>
+            <a:ext cx="2743200" cy="365125"/>
+          </a:xfrm>
+        </p:spPr>
+        <p:txBody>
+          <a:bodyPr/>
+          <a:lstStyle/>
+          <a:p>
+            <a:r>
+              <a:rPr lang="de-DE"/>
+              <a:t>	 </a:t>
+            </a:r>
+            <a:fld id="{2D4C594A-0DAD-48BB-BE3B-8241EF812AB5}" type="slidenum">
+              <a:rPr lang="de-DE" smtClean="0"/>
+              <a:t>11</a:t>
+            </a:fld>
+            <a:endParaRPr lang="de-DE" dirty="0"/>
+          </a:p>
+        </p:txBody>
+      </p:sp>
+      <p:sp>
+        <p:nvSpPr>
+          <p:cNvPr id="10" name="Textfeld 9">
+            <a:extLst>
+              <a:ext uri="{FF2B5EF4-FFF2-40B4-BE49-F238E27FC236}">
+                <a16:creationId xmlns:a16="http://schemas.microsoft.com/office/drawing/2014/main" id="{2A75AA0E-7344-41A6-A903-9D8A4164AF90}"/>
+              </a:ext>
+            </a:extLst>
+          </p:cNvPr>
+          <p:cNvSpPr txBox="1"/>
+          <p:nvPr/>
+        </p:nvSpPr>
+        <p:spPr>
+          <a:xfrm>
+            <a:off x="1459684" y="788564"/>
+            <a:ext cx="7499758" cy="369332"/>
+          </a:xfrm>
+          <a:prstGeom prst="rect">
+            <a:avLst/>
+          </a:prstGeom>
+          <a:noFill/>
+        </p:spPr>
+        <p:txBody>
+          <a:bodyPr wrap="square" rtlCol="0">
+            <a:spAutoFit/>
+          </a:bodyPr>
+          <a:lstStyle/>
+          <a:p>
+            <a:endParaRPr lang="de-DE" dirty="0"/>
+          </a:p>
+        </p:txBody>
+      </p:sp>
+      <p:sp>
+        <p:nvSpPr>
+          <p:cNvPr id="8" name="Textfeld 7">
+            <a:extLst>
+              <a:ext uri="{FF2B5EF4-FFF2-40B4-BE49-F238E27FC236}">
+                <a16:creationId xmlns:a16="http://schemas.microsoft.com/office/drawing/2014/main" id="{EDBFFB49-FAAA-4383-912E-DCAAB9C0367D}"/>
+              </a:ext>
+            </a:extLst>
+          </p:cNvPr>
+          <p:cNvSpPr txBox="1"/>
+          <p:nvPr/>
+        </p:nvSpPr>
+        <p:spPr>
+          <a:xfrm>
+            <a:off x="1281887" y="760332"/>
             <a:ext cx="3964290" cy="769441"/>
           </a:xfrm>
           <a:prstGeom prst="rect">
@@ -6108,30 +6421,203 @@
           </a:p>
         </p:txBody>
       </p:sp>
-      <p:graphicFrame>
-        <p:nvGraphicFramePr>
-          <p:cNvPr id="11" name="Diagramm 10">
+      <p:grpSp>
+        <p:nvGrpSpPr>
+          <p:cNvPr id="14" name="Gruppieren 13">
             <a:extLst>
               <a:ext uri="{FF2B5EF4-FFF2-40B4-BE49-F238E27FC236}">
-                <a16:creationId xmlns:a16="http://schemas.microsoft.com/office/drawing/2014/main" id="{2218D692-9CA0-4687-84DA-C8B4C4BD72B4}"/>
+                <a16:creationId xmlns:a16="http://schemas.microsoft.com/office/drawing/2014/main" id="{CEBF1EAF-B4FE-458E-9087-590E9E24D537}"/>
               </a:ext>
             </a:extLst>
           </p:cNvPr>
-          <p:cNvGraphicFramePr>
-            <a:graphicFrameLocks/>
-          </p:cNvGraphicFramePr>
+          <p:cNvGrpSpPr/>
           <p:nvPr/>
-        </p:nvGraphicFramePr>
-        <p:xfrm>
-          <a:off x="465044" y="1502148"/>
-          <a:ext cx="11261912" cy="3853704"/>
-        </p:xfrm>
-        <a:graphic>
-          <a:graphicData uri="http://schemas.openxmlformats.org/drawingml/2006/chart">
-            <c:chart xmlns:c="http://schemas.openxmlformats.org/drawingml/2006/chart" xmlns:r="http://schemas.openxmlformats.org/officeDocument/2006/relationships" r:id="rId2"/>
-          </a:graphicData>
-        </a:graphic>
-      </p:graphicFrame>
+        </p:nvGrpSpPr>
+        <p:grpSpPr>
+          <a:xfrm>
+            <a:off x="371057" y="1830267"/>
+            <a:ext cx="11261912" cy="3853704"/>
+            <a:chOff x="0" y="-153266"/>
+            <a:chExt cx="11261912" cy="3853704"/>
+          </a:xfrm>
+        </p:grpSpPr>
+        <p:graphicFrame>
+          <p:nvGraphicFramePr>
+            <p:cNvPr id="15" name="Diagramm 14">
+              <a:extLst>
+                <a:ext uri="{FF2B5EF4-FFF2-40B4-BE49-F238E27FC236}">
+                  <a16:creationId xmlns:a16="http://schemas.microsoft.com/office/drawing/2014/main" id="{2218D692-9CA0-4687-84DA-C8B4C4BD72B4}"/>
+                </a:ext>
+              </a:extLst>
+            </p:cNvPr>
+            <p:cNvGraphicFramePr/>
+            <p:nvPr>
+              <p:extLst>
+                <p:ext uri="{D42A27DB-BD31-4B8C-83A1-F6EECF244321}">
+                  <p14:modId xmlns:p14="http://schemas.microsoft.com/office/powerpoint/2010/main" val="652949233"/>
+                </p:ext>
+              </p:extLst>
+            </p:nvPr>
+          </p:nvGraphicFramePr>
+          <p:xfrm>
+            <a:off x="0" y="-153266"/>
+            <a:ext cx="11261912" cy="3853704"/>
+          </p:xfrm>
+          <a:graphic>
+            <a:graphicData uri="http://schemas.openxmlformats.org/drawingml/2006/chart">
+              <c:chart xmlns:c="http://schemas.openxmlformats.org/drawingml/2006/chart" xmlns:r="http://schemas.openxmlformats.org/officeDocument/2006/relationships" r:id="rId2"/>
+            </a:graphicData>
+          </a:graphic>
+        </p:graphicFrame>
+        <p:sp>
+          <p:nvSpPr>
+            <p:cNvPr id="16" name="Sprechblase: rechteckig 15">
+              <a:extLst>
+                <a:ext uri="{FF2B5EF4-FFF2-40B4-BE49-F238E27FC236}">
+                  <a16:creationId xmlns:a16="http://schemas.microsoft.com/office/drawing/2014/main" id="{7D34716B-09CC-44F8-A7DD-0512E7924E6C}"/>
+                </a:ext>
+              </a:extLst>
+            </p:cNvPr>
+            <p:cNvSpPr/>
+            <p:nvPr/>
+          </p:nvSpPr>
+          <p:spPr>
+            <a:xfrm>
+              <a:off x="2617237" y="153266"/>
+              <a:ext cx="2173940" cy="784412"/>
+            </a:xfrm>
+            <a:prstGeom prst="wedgeRectCallout">
+              <a:avLst>
+                <a:gd name="adj1" fmla="val -154116"/>
+                <a:gd name="adj2" fmla="val -2284"/>
+              </a:avLst>
+            </a:prstGeom>
+          </p:spPr>
+          <p:style>
+            <a:lnRef idx="2">
+              <a:schemeClr val="accent1">
+                <a:shade val="50000"/>
+              </a:schemeClr>
+            </a:lnRef>
+            <a:fillRef idx="1">
+              <a:schemeClr val="accent1"/>
+            </a:fillRef>
+            <a:effectRef idx="0">
+              <a:schemeClr val="accent1"/>
+            </a:effectRef>
+            <a:fontRef idx="minor">
+              <a:schemeClr val="lt1"/>
+            </a:fontRef>
+          </p:style>
+          <p:txBody>
+            <a:bodyPr rtlCol="0" anchor="t"/>
+            <a:lstStyle>
+              <a:lvl1pPr marL="0" indent="0">
+                <a:defRPr sz="1100">
+                  <a:solidFill>
+                    <a:schemeClr val="lt1"/>
+                  </a:solidFill>
+                  <a:latin typeface="+mn-lt"/>
+                  <a:ea typeface="+mn-ea"/>
+                  <a:cs typeface="+mn-cs"/>
+                </a:defRPr>
+              </a:lvl1pPr>
+              <a:lvl2pPr marL="457200" indent="0">
+                <a:defRPr sz="1100">
+                  <a:solidFill>
+                    <a:schemeClr val="lt1"/>
+                  </a:solidFill>
+                  <a:latin typeface="+mn-lt"/>
+                  <a:ea typeface="+mn-ea"/>
+                  <a:cs typeface="+mn-cs"/>
+                </a:defRPr>
+              </a:lvl2pPr>
+              <a:lvl3pPr marL="914400" indent="0">
+                <a:defRPr sz="1100">
+                  <a:solidFill>
+                    <a:schemeClr val="lt1"/>
+                  </a:solidFill>
+                  <a:latin typeface="+mn-lt"/>
+                  <a:ea typeface="+mn-ea"/>
+                  <a:cs typeface="+mn-cs"/>
+                </a:defRPr>
+              </a:lvl3pPr>
+              <a:lvl4pPr marL="1371600" indent="0">
+                <a:defRPr sz="1100">
+                  <a:solidFill>
+                    <a:schemeClr val="lt1"/>
+                  </a:solidFill>
+                  <a:latin typeface="+mn-lt"/>
+                  <a:ea typeface="+mn-ea"/>
+                  <a:cs typeface="+mn-cs"/>
+                </a:defRPr>
+              </a:lvl4pPr>
+              <a:lvl5pPr marL="1828800" indent="0">
+                <a:defRPr sz="1100">
+                  <a:solidFill>
+                    <a:schemeClr val="lt1"/>
+                  </a:solidFill>
+                  <a:latin typeface="+mn-lt"/>
+                  <a:ea typeface="+mn-ea"/>
+                  <a:cs typeface="+mn-cs"/>
+                </a:defRPr>
+              </a:lvl5pPr>
+              <a:lvl6pPr marL="2286000" indent="0">
+                <a:defRPr sz="1100">
+                  <a:solidFill>
+                    <a:schemeClr val="lt1"/>
+                  </a:solidFill>
+                  <a:latin typeface="+mn-lt"/>
+                  <a:ea typeface="+mn-ea"/>
+                  <a:cs typeface="+mn-cs"/>
+                </a:defRPr>
+              </a:lvl6pPr>
+              <a:lvl7pPr marL="2743200" indent="0">
+                <a:defRPr sz="1100">
+                  <a:solidFill>
+                    <a:schemeClr val="lt1"/>
+                  </a:solidFill>
+                  <a:latin typeface="+mn-lt"/>
+                  <a:ea typeface="+mn-ea"/>
+                  <a:cs typeface="+mn-cs"/>
+                </a:defRPr>
+              </a:lvl7pPr>
+              <a:lvl8pPr marL="3200400" indent="0">
+                <a:defRPr sz="1100">
+                  <a:solidFill>
+                    <a:schemeClr val="lt1"/>
+                  </a:solidFill>
+                  <a:latin typeface="+mn-lt"/>
+                  <a:ea typeface="+mn-ea"/>
+                  <a:cs typeface="+mn-cs"/>
+                </a:defRPr>
+              </a:lvl8pPr>
+              <a:lvl9pPr marL="3657600" indent="0">
+                <a:defRPr sz="1100">
+                  <a:solidFill>
+                    <a:schemeClr val="lt1"/>
+                  </a:solidFill>
+                  <a:latin typeface="+mn-lt"/>
+                  <a:ea typeface="+mn-ea"/>
+                  <a:cs typeface="+mn-cs"/>
+                </a:defRPr>
+              </a:lvl9pPr>
+            </a:lstStyle>
+            <a:p>
+              <a:pPr algn="l"/>
+              <a:r>
+                <a:rPr lang="de-DE" sz="1100" dirty="0"/>
+                <a:t>Beim ersten Meeting herrschte eine hohe</a:t>
+              </a:r>
+              <a:r>
+                <a:rPr lang="de-DE" sz="1100" baseline="0" dirty="0"/>
+                <a:t> Motivation, gleichzeitig aber auch die geringste Strukturiertheit        </a:t>
+              </a:r>
+              <a:endParaRPr lang="de-DE" sz="1100" dirty="0"/>
+            </a:p>
+          </p:txBody>
+        </p:sp>
+      </p:grpSp>
     </p:spTree>
     <p:extLst>
       <p:ext uri="{BB962C8B-B14F-4D97-AF65-F5344CB8AC3E}">
@@ -8454,45 +8940,52 @@
           <p:nvPr>
             <p:extLst>
               <p:ext uri="{D42A27DB-BD31-4B8C-83A1-F6EECF244321}">
-                <p14:modId xmlns:p14="http://schemas.microsoft.com/office/powerpoint/2010/main" val="267671578"/>
+                <p14:modId xmlns:p14="http://schemas.microsoft.com/office/powerpoint/2010/main" val="2712569045"/>
               </p:ext>
             </p:extLst>
           </p:nvPr>
         </p:nvGraphicFramePr>
         <p:xfrm>
-          <a:off x="1281887" y="1901650"/>
-          <a:ext cx="9760213" cy="4090365"/>
+          <a:off x="1281886" y="1413970"/>
+          <a:ext cx="10518228" cy="4576638"/>
         </p:xfrm>
         <a:graphic>
           <a:graphicData uri="http://schemas.openxmlformats.org/drawingml/2006/table">
             <a:tbl>
               <a:tblPr firstRow="1" firstCol="1" bandRow="1"/>
               <a:tblGrid>
-                <a:gridCol w="2693813">
+                <a:gridCol w="2650452">
                   <a:extLst>
                     <a:ext uri="{9D8B030D-6E8A-4147-A177-3AD203B41FA5}">
                       <a16:colId xmlns:a16="http://schemas.microsoft.com/office/drawing/2014/main" val="1937100112"/>
                     </a:ext>
                   </a:extLst>
                 </a:gridCol>
-                <a:gridCol w="3521682">
+                <a:gridCol w="3464994">
                   <a:extLst>
                     <a:ext uri="{9D8B030D-6E8A-4147-A177-3AD203B41FA5}">
                       <a16:colId xmlns:a16="http://schemas.microsoft.com/office/drawing/2014/main" val="1805933689"/>
                     </a:ext>
                   </a:extLst>
                 </a:gridCol>
-                <a:gridCol w="2614625">
+                <a:gridCol w="2272805">
                   <a:extLst>
                     <a:ext uri="{9D8B030D-6E8A-4147-A177-3AD203B41FA5}">
                       <a16:colId xmlns:a16="http://schemas.microsoft.com/office/drawing/2014/main" val="210679154"/>
                     </a:ext>
                   </a:extLst>
                 </a:gridCol>
-                <a:gridCol w="930093">
+                <a:gridCol w="780149">
                   <a:extLst>
                     <a:ext uri="{9D8B030D-6E8A-4147-A177-3AD203B41FA5}">
                       <a16:colId xmlns:a16="http://schemas.microsoft.com/office/drawing/2014/main" val="3002741590"/>
+                    </a:ext>
+                  </a:extLst>
+                </a:gridCol>
+                <a:gridCol w="1349828">
+                  <a:extLst>
+                    <a:ext uri="{9D8B030D-6E8A-4147-A177-3AD203B41FA5}">
+                      <a16:colId xmlns:a16="http://schemas.microsoft.com/office/drawing/2014/main" val="3554861885"/>
                     </a:ext>
                   </a:extLst>
                 </a:gridCol>
@@ -8725,7 +9218,7 @@
                         </a:spcAft>
                       </a:pPr>
                       <a:r>
-                        <a:rPr lang="de-DE" sz="1600" b="0" i="0" u="none" strike="noStrike">
+                        <a:rPr lang="de-DE" sz="1600" b="0" i="0" u="none" strike="noStrike" dirty="0">
                           <a:effectLst/>
                           <a:latin typeface="Calibri" panose="020F0502020204030204" pitchFamily="34" charset="0"/>
                           <a:ea typeface="Calibri" panose="020F0502020204030204" pitchFamily="34" charset="0"/>
@@ -8733,10 +9226,78 @@
                         </a:rPr>
                         <a:t>Ampel</a:t>
                       </a:r>
-                      <a:endParaRPr lang="de-DE" sz="2900" b="0" i="0" u="none" strike="noStrike">
+                      <a:endParaRPr lang="de-DE" sz="2900" b="0" i="0" u="none" strike="noStrike" dirty="0">
                         <a:effectLst/>
                         <a:latin typeface="Arial" panose="020B0604020202020204" pitchFamily="34" charset="0"/>
                       </a:endParaRPr>
+                    </a:p>
+                  </a:txBody>
+                  <a:tcPr marL="108842" marR="108842" marT="15117" marB="0">
+                    <a:lnL w="12700" cap="flat" cmpd="sng" algn="ctr">
+                      <a:solidFill>
+                        <a:srgbClr val="000000"/>
+                      </a:solidFill>
+                      <a:prstDash val="solid"/>
+                      <a:round/>
+                      <a:headEnd type="none" w="med" len="med"/>
+                      <a:tailEnd type="none" w="med" len="med"/>
+                    </a:lnL>
+                    <a:lnR w="12700" cap="flat" cmpd="sng" algn="ctr">
+                      <a:solidFill>
+                        <a:srgbClr val="000000"/>
+                      </a:solidFill>
+                      <a:prstDash val="solid"/>
+                      <a:round/>
+                      <a:headEnd type="none" w="med" len="med"/>
+                      <a:tailEnd type="none" w="med" len="med"/>
+                    </a:lnR>
+                    <a:lnT w="12700" cap="flat" cmpd="sng" algn="ctr">
+                      <a:solidFill>
+                        <a:srgbClr val="000000"/>
+                      </a:solidFill>
+                      <a:prstDash val="solid"/>
+                      <a:round/>
+                      <a:headEnd type="none" w="med" len="med"/>
+                      <a:tailEnd type="none" w="med" len="med"/>
+                    </a:lnT>
+                    <a:lnB w="12700" cap="flat" cmpd="sng" algn="ctr">
+                      <a:solidFill>
+                        <a:srgbClr val="000000"/>
+                      </a:solidFill>
+                      <a:prstDash val="solid"/>
+                      <a:round/>
+                      <a:headEnd type="none" w="med" len="med"/>
+                      <a:tailEnd type="none" w="med" len="med"/>
+                    </a:lnB>
+                  </a:tcPr>
+                </a:tc>
+                <a:tc>
+                  <a:txBody>
+                    <a:bodyPr/>
+                    <a:lstStyle/>
+                    <a:p>
+                      <a:pPr algn="l" fontAlgn="t">
+                        <a:lnSpc>
+                          <a:spcPct val="107000"/>
+                        </a:lnSpc>
+                        <a:spcBef>
+                          <a:spcPts val="0"/>
+                        </a:spcBef>
+                        <a:spcAft>
+                          <a:spcPts val="800"/>
+                        </a:spcAft>
+                      </a:pPr>
+                      <a:r>
+                        <a:rPr lang="de-DE" sz="1600" b="0" i="0" u="none" strike="noStrike" kern="1200" dirty="0">
+                          <a:solidFill>
+                            <a:schemeClr val="tx1"/>
+                          </a:solidFill>
+                          <a:effectLst/>
+                          <a:latin typeface="Calibri" panose="020F0502020204030204" pitchFamily="34" charset="0"/>
+                          <a:cs typeface="Times New Roman" panose="02020603050405020304" pitchFamily="18" charset="0"/>
+                        </a:rPr>
+                        <a:t>Schadensaus-maß</a:t>
+                      </a:r>
                     </a:p>
                   </a:txBody>
                   <a:tcPr marL="108842" marR="108842" marT="15117" marB="0">
@@ -8942,7 +9503,7 @@
                         </a:spcAft>
                       </a:pPr>
                       <a:r>
-                        <a:rPr lang="de-DE" sz="1600" b="0" i="0" u="none" strike="noStrike">
+                        <a:rPr lang="de-DE" sz="1600" b="0" i="0" u="none" strike="noStrike" dirty="0">
                           <a:effectLst/>
                           <a:latin typeface="Calibri" panose="020F0502020204030204" pitchFamily="34" charset="0"/>
                           <a:ea typeface="Calibri" panose="020F0502020204030204" pitchFamily="34" charset="0"/>
@@ -8950,7 +9511,7 @@
                         </a:rPr>
                         <a:t> </a:t>
                       </a:r>
-                      <a:endParaRPr lang="de-DE" sz="2900" b="0" i="0" u="none" strike="noStrike">
+                      <a:endParaRPr lang="de-DE" sz="2900" b="0" i="0" u="none" strike="noStrike" dirty="0">
                         <a:effectLst/>
                         <a:latin typeface="Arial" panose="020B0604020202020204" pitchFamily="34" charset="0"/>
                       </a:endParaRPr>
@@ -9065,6 +9626,71 @@
                     </a:lnB>
                   </a:tcPr>
                 </a:tc>
+                <a:tc>
+                  <a:txBody>
+                    <a:bodyPr/>
+                    <a:lstStyle/>
+                    <a:p>
+                      <a:pPr algn="l" fontAlgn="t">
+                        <a:lnSpc>
+                          <a:spcPct val="107000"/>
+                        </a:lnSpc>
+                        <a:spcBef>
+                          <a:spcPts val="0"/>
+                        </a:spcBef>
+                        <a:spcAft>
+                          <a:spcPts val="800"/>
+                        </a:spcAft>
+                      </a:pPr>
+                      <a:endParaRPr lang="de-DE" sz="1600" b="0" i="0" u="none" strike="noStrike" kern="1200" dirty="0">
+                        <a:solidFill>
+                          <a:schemeClr val="tx1"/>
+                        </a:solidFill>
+                        <a:effectLst/>
+                        <a:latin typeface="Calibri" panose="020F0502020204030204" pitchFamily="34" charset="0"/>
+                        <a:cs typeface="Times New Roman" panose="02020603050405020304" pitchFamily="18" charset="0"/>
+                      </a:endParaRPr>
+                    </a:p>
+                  </a:txBody>
+                  <a:tcPr marL="108842" marR="108842" marT="15117" marB="0">
+                    <a:lnL w="12700" cap="flat" cmpd="sng" algn="ctr">
+                      <a:solidFill>
+                        <a:srgbClr val="000000"/>
+                      </a:solidFill>
+                      <a:prstDash val="solid"/>
+                      <a:round/>
+                      <a:headEnd type="none" w="med" len="med"/>
+                      <a:tailEnd type="none" w="med" len="med"/>
+                    </a:lnL>
+                    <a:lnR w="12700" cap="flat" cmpd="sng" algn="ctr">
+                      <a:solidFill>
+                        <a:srgbClr val="000000"/>
+                      </a:solidFill>
+                      <a:prstDash val="solid"/>
+                      <a:round/>
+                      <a:headEnd type="none" w="med" len="med"/>
+                      <a:tailEnd type="none" w="med" len="med"/>
+                    </a:lnR>
+                    <a:lnT w="12700" cap="flat" cmpd="sng" algn="ctr">
+                      <a:solidFill>
+                        <a:srgbClr val="000000"/>
+                      </a:solidFill>
+                      <a:prstDash val="solid"/>
+                      <a:round/>
+                      <a:headEnd type="none" w="med" len="med"/>
+                      <a:tailEnd type="none" w="med" len="med"/>
+                    </a:lnT>
+                    <a:lnB w="12700" cap="flat" cmpd="sng" algn="ctr">
+                      <a:solidFill>
+                        <a:srgbClr val="000000"/>
+                      </a:solidFill>
+                      <a:prstDash val="solid"/>
+                      <a:round/>
+                      <a:headEnd type="none" w="med" len="med"/>
+                      <a:tailEnd type="none" w="med" len="med"/>
+                    </a:lnB>
+                  </a:tcPr>
+                </a:tc>
                 <a:extLst>
                   <a:ext uri="{0D108BD9-81ED-4DB2-BD59-A6C34878D82A}">
                     <a16:rowId xmlns:a16="http://schemas.microsoft.com/office/drawing/2014/main" val="2564595019"/>
@@ -9089,7 +9715,7 @@
                         </a:spcAft>
                       </a:pPr>
                       <a:r>
-                        <a:rPr lang="de-DE" sz="1600" b="0" i="0" u="none" strike="noStrike">
+                        <a:rPr lang="de-DE" sz="1600" b="0" i="0" u="none" strike="noStrike" dirty="0">
                           <a:effectLst/>
                           <a:latin typeface="Calibri" panose="020F0502020204030204" pitchFamily="34" charset="0"/>
                           <a:ea typeface="Calibri" panose="020F0502020204030204" pitchFamily="34" charset="0"/>
@@ -9097,7 +9723,7 @@
                         </a:rPr>
                         <a:t>Projekt wird nicht fertig gestellt</a:t>
                       </a:r>
-                      <a:endParaRPr lang="de-DE" sz="2900" b="0" i="0" u="none" strike="noStrike">
+                      <a:endParaRPr lang="de-DE" sz="2900" b="0" i="0" u="none" strike="noStrike" dirty="0">
                         <a:effectLst/>
                         <a:latin typeface="Arial" panose="020B0604020202020204" pitchFamily="34" charset="0"/>
                       </a:endParaRPr>
@@ -9140,6 +9766,7 @@
                       <a:headEnd type="none" w="med" len="med"/>
                       <a:tailEnd type="none" w="med" len="med"/>
                     </a:lnB>
+                    <a:noFill/>
                   </a:tcPr>
                 </a:tc>
                 <a:tc>
@@ -9229,7 +9856,7 @@
                         </a:spcAft>
                       </a:pPr>
                       <a:r>
-                        <a:rPr lang="de-DE" sz="1600" b="0" i="0" u="none" strike="noStrike">
+                        <a:rPr lang="de-DE" sz="1600" b="0" i="0" u="none" strike="noStrike" dirty="0">
                           <a:effectLst/>
                           <a:latin typeface="Calibri" panose="020F0502020204030204" pitchFamily="34" charset="0"/>
                           <a:ea typeface="Calibri" panose="020F0502020204030204" pitchFamily="34" charset="0"/>
@@ -9237,7 +9864,366 @@
                         </a:rPr>
                         <a:t>Frühzeitiges Erkennen von Rückständen</a:t>
                       </a:r>
-                      <a:endParaRPr lang="de-DE" sz="2900" b="0" i="0" u="none" strike="noStrike">
+                      <a:endParaRPr lang="de-DE" sz="2900" b="0" i="0" u="none" strike="noStrike" dirty="0">
+                        <a:effectLst/>
+                        <a:latin typeface="Arial" panose="020B0604020202020204" pitchFamily="34" charset="0"/>
+                      </a:endParaRPr>
+                    </a:p>
+                  </a:txBody>
+                  <a:tcPr marL="108842" marR="108842" marT="15117" marB="0">
+                    <a:lnL w="12700" cap="flat" cmpd="sng" algn="ctr">
+                      <a:solidFill>
+                        <a:srgbClr val="000000"/>
+                      </a:solidFill>
+                      <a:prstDash val="solid"/>
+                      <a:round/>
+                      <a:headEnd type="none" w="med" len="med"/>
+                      <a:tailEnd type="none" w="med" len="med"/>
+                    </a:lnL>
+                    <a:lnR w="12700" cap="flat" cmpd="sng" algn="ctr">
+                      <a:solidFill>
+                        <a:srgbClr val="000000"/>
+                      </a:solidFill>
+                      <a:prstDash val="solid"/>
+                      <a:round/>
+                      <a:headEnd type="none" w="med" len="med"/>
+                      <a:tailEnd type="none" w="med" len="med"/>
+                    </a:lnR>
+                    <a:lnT w="12700" cap="flat" cmpd="sng" algn="ctr">
+                      <a:solidFill>
+                        <a:srgbClr val="000000"/>
+                      </a:solidFill>
+                      <a:prstDash val="solid"/>
+                      <a:round/>
+                      <a:headEnd type="none" w="med" len="med"/>
+                      <a:tailEnd type="none" w="med" len="med"/>
+                    </a:lnT>
+                    <a:lnB w="12700" cap="flat" cmpd="sng" algn="ctr">
+                      <a:solidFill>
+                        <a:srgbClr val="000000"/>
+                      </a:solidFill>
+                      <a:prstDash val="solid"/>
+                      <a:round/>
+                      <a:headEnd type="none" w="med" len="med"/>
+                      <a:tailEnd type="none" w="med" len="med"/>
+                    </a:lnB>
+                  </a:tcPr>
+                </a:tc>
+                <a:tc>
+                  <a:txBody>
+                    <a:bodyPr/>
+                    <a:lstStyle/>
+                    <a:p>
+                      <a:pPr algn="l" fontAlgn="t">
+                        <a:lnSpc>
+                          <a:spcPct val="107000"/>
+                        </a:lnSpc>
+                        <a:spcBef>
+                          <a:spcPts val="0"/>
+                        </a:spcBef>
+                        <a:spcAft>
+                          <a:spcPts val="800"/>
+                        </a:spcAft>
+                      </a:pPr>
+                      <a:r>
+                        <a:rPr lang="de-DE" sz="1600" b="0" i="0" u="none" strike="noStrike" dirty="0">
+                          <a:effectLst/>
+                          <a:latin typeface="Calibri" panose="020F0502020204030204" pitchFamily="34" charset="0"/>
+                          <a:ea typeface="Calibri" panose="020F0502020204030204" pitchFamily="34" charset="0"/>
+                          <a:cs typeface="Times New Roman" panose="02020603050405020304" pitchFamily="18" charset="0"/>
+                        </a:rPr>
+                        <a:t> </a:t>
+                      </a:r>
+                      <a:endParaRPr lang="de-DE" sz="2900" b="0" i="0" u="none" strike="noStrike" dirty="0">
+                        <a:effectLst/>
+                        <a:latin typeface="Arial" panose="020B0604020202020204" pitchFamily="34" charset="0"/>
+                      </a:endParaRPr>
+                    </a:p>
+                  </a:txBody>
+                  <a:tcPr marL="108842" marR="108842" marT="15117" marB="0">
+                    <a:lnL w="12700" cap="flat" cmpd="sng" algn="ctr">
+                      <a:solidFill>
+                        <a:srgbClr val="000000"/>
+                      </a:solidFill>
+                      <a:prstDash val="solid"/>
+                      <a:round/>
+                      <a:headEnd type="none" w="med" len="med"/>
+                      <a:tailEnd type="none" w="med" len="med"/>
+                    </a:lnL>
+                    <a:lnR w="12700" cap="flat" cmpd="sng" algn="ctr">
+                      <a:solidFill>
+                        <a:srgbClr val="000000"/>
+                      </a:solidFill>
+                      <a:prstDash val="solid"/>
+                      <a:round/>
+                      <a:headEnd type="none" w="med" len="med"/>
+                      <a:tailEnd type="none" w="med" len="med"/>
+                    </a:lnR>
+                    <a:lnT w="12700" cap="flat" cmpd="sng" algn="ctr">
+                      <a:solidFill>
+                        <a:srgbClr val="000000"/>
+                      </a:solidFill>
+                      <a:prstDash val="solid"/>
+                      <a:round/>
+                      <a:headEnd type="none" w="med" len="med"/>
+                      <a:tailEnd type="none" w="med" len="med"/>
+                    </a:lnT>
+                    <a:lnB w="12700" cap="flat" cmpd="sng" algn="ctr">
+                      <a:solidFill>
+                        <a:srgbClr val="000000"/>
+                      </a:solidFill>
+                      <a:prstDash val="solid"/>
+                      <a:round/>
+                      <a:headEnd type="none" w="med" len="med"/>
+                      <a:tailEnd type="none" w="med" len="med"/>
+                    </a:lnB>
+                    <a:solidFill>
+                      <a:srgbClr val="FF0000"/>
+                    </a:solidFill>
+                  </a:tcPr>
+                </a:tc>
+                <a:tc>
+                  <a:txBody>
+                    <a:bodyPr/>
+                    <a:lstStyle/>
+                    <a:p>
+                      <a:pPr algn="l" fontAlgn="t">
+                        <a:lnSpc>
+                          <a:spcPct val="107000"/>
+                        </a:lnSpc>
+                        <a:spcBef>
+                          <a:spcPts val="0"/>
+                        </a:spcBef>
+                        <a:spcAft>
+                          <a:spcPts val="800"/>
+                        </a:spcAft>
+                      </a:pPr>
+                      <a:r>
+                        <a:rPr lang="de-DE" sz="1600" b="0" i="0" u="none" strike="noStrike" kern="1200" dirty="0">
+                          <a:solidFill>
+                            <a:schemeClr val="tx1"/>
+                          </a:solidFill>
+                          <a:effectLst/>
+                          <a:latin typeface="Calibri" panose="020F0502020204030204" pitchFamily="34" charset="0"/>
+                          <a:cs typeface="Times New Roman" panose="02020603050405020304" pitchFamily="18" charset="0"/>
+                        </a:rPr>
+                        <a:t>10</a:t>
+                      </a:r>
+                    </a:p>
+                  </a:txBody>
+                  <a:tcPr marL="108842" marR="108842" marT="15117" marB="0">
+                    <a:lnL w="12700" cap="flat" cmpd="sng" algn="ctr">
+                      <a:solidFill>
+                        <a:srgbClr val="000000"/>
+                      </a:solidFill>
+                      <a:prstDash val="solid"/>
+                      <a:round/>
+                      <a:headEnd type="none" w="med" len="med"/>
+                      <a:tailEnd type="none" w="med" len="med"/>
+                    </a:lnL>
+                    <a:lnR w="12700" cap="flat" cmpd="sng" algn="ctr">
+                      <a:solidFill>
+                        <a:srgbClr val="000000"/>
+                      </a:solidFill>
+                      <a:prstDash val="solid"/>
+                      <a:round/>
+                      <a:headEnd type="none" w="med" len="med"/>
+                      <a:tailEnd type="none" w="med" len="med"/>
+                    </a:lnR>
+                    <a:lnT w="12700" cap="flat" cmpd="sng" algn="ctr">
+                      <a:solidFill>
+                        <a:srgbClr val="000000"/>
+                      </a:solidFill>
+                      <a:prstDash val="solid"/>
+                      <a:round/>
+                      <a:headEnd type="none" w="med" len="med"/>
+                      <a:tailEnd type="none" w="med" len="med"/>
+                    </a:lnT>
+                    <a:lnB w="12700" cap="flat" cmpd="sng" algn="ctr">
+                      <a:solidFill>
+                        <a:srgbClr val="000000"/>
+                      </a:solidFill>
+                      <a:prstDash val="solid"/>
+                      <a:round/>
+                      <a:headEnd type="none" w="med" len="med"/>
+                      <a:tailEnd type="none" w="med" len="med"/>
+                    </a:lnB>
+                    <a:noFill/>
+                  </a:tcPr>
+                </a:tc>
+                <a:extLst>
+                  <a:ext uri="{0D108BD9-81ED-4DB2-BD59-A6C34878D82A}">
+                    <a16:rowId xmlns:a16="http://schemas.microsoft.com/office/drawing/2014/main" val="2187251753"/>
+                  </a:ext>
+                </a:extLst>
+              </a:tr>
+              <a:tr h="554536">
+                <a:tc>
+                  <a:txBody>
+                    <a:bodyPr/>
+                    <a:lstStyle/>
+                    <a:p>
+                      <a:pPr algn="l" fontAlgn="t">
+                        <a:lnSpc>
+                          <a:spcPct val="107000"/>
+                        </a:lnSpc>
+                        <a:spcBef>
+                          <a:spcPts val="0"/>
+                        </a:spcBef>
+                        <a:spcAft>
+                          <a:spcPts val="800"/>
+                        </a:spcAft>
+                      </a:pPr>
+                      <a:r>
+                        <a:rPr lang="de-DE" sz="1600" b="0" i="0" u="none" strike="noStrike" dirty="0">
+                          <a:effectLst/>
+                          <a:latin typeface="Calibri" panose="020F0502020204030204" pitchFamily="34" charset="0"/>
+                          <a:ea typeface="Calibri" panose="020F0502020204030204" pitchFamily="34" charset="0"/>
+                          <a:cs typeface="Times New Roman" panose="02020603050405020304" pitchFamily="18" charset="0"/>
+                        </a:rPr>
+                        <a:t>System misst falsch oder gar nicht</a:t>
+                      </a:r>
+                      <a:endParaRPr lang="de-DE" sz="2900" b="0" i="0" u="none" strike="noStrike" dirty="0">
+                        <a:effectLst/>
+                        <a:latin typeface="Arial" panose="020B0604020202020204" pitchFamily="34" charset="0"/>
+                      </a:endParaRPr>
+                    </a:p>
+                  </a:txBody>
+                  <a:tcPr marL="108842" marR="108842" marT="15117" marB="0">
+                    <a:lnL w="12700" cap="flat" cmpd="sng" algn="ctr">
+                      <a:solidFill>
+                        <a:srgbClr val="000000"/>
+                      </a:solidFill>
+                      <a:prstDash val="solid"/>
+                      <a:round/>
+                      <a:headEnd type="none" w="med" len="med"/>
+                      <a:tailEnd type="none" w="med" len="med"/>
+                    </a:lnL>
+                    <a:lnR w="12700" cap="flat" cmpd="sng" algn="ctr">
+                      <a:solidFill>
+                        <a:srgbClr val="000000"/>
+                      </a:solidFill>
+                      <a:prstDash val="solid"/>
+                      <a:round/>
+                      <a:headEnd type="none" w="med" len="med"/>
+                      <a:tailEnd type="none" w="med" len="med"/>
+                    </a:lnR>
+                    <a:lnT w="12700" cap="flat" cmpd="sng" algn="ctr">
+                      <a:solidFill>
+                        <a:srgbClr val="000000"/>
+                      </a:solidFill>
+                      <a:prstDash val="solid"/>
+                      <a:round/>
+                      <a:headEnd type="none" w="med" len="med"/>
+                      <a:tailEnd type="none" w="med" len="med"/>
+                    </a:lnT>
+                    <a:lnB w="12700" cap="flat" cmpd="sng" algn="ctr">
+                      <a:solidFill>
+                        <a:srgbClr val="000000"/>
+                      </a:solidFill>
+                      <a:prstDash val="solid"/>
+                      <a:round/>
+                      <a:headEnd type="none" w="med" len="med"/>
+                      <a:tailEnd type="none" w="med" len="med"/>
+                    </a:lnB>
+                  </a:tcPr>
+                </a:tc>
+                <a:tc>
+                  <a:txBody>
+                    <a:bodyPr/>
+                    <a:lstStyle/>
+                    <a:p>
+                      <a:pPr algn="l" fontAlgn="t">
+                        <a:lnSpc>
+                          <a:spcPct val="107000"/>
+                        </a:lnSpc>
+                        <a:spcBef>
+                          <a:spcPts val="0"/>
+                        </a:spcBef>
+                        <a:spcAft>
+                          <a:spcPts val="800"/>
+                        </a:spcAft>
+                      </a:pPr>
+                      <a:r>
+                        <a:rPr lang="de-DE" sz="1600" b="0" i="0" u="none" strike="noStrike" dirty="0">
+                          <a:effectLst/>
+                          <a:latin typeface="Calibri" panose="020F0502020204030204" pitchFamily="34" charset="0"/>
+                          <a:ea typeface="Calibri" panose="020F0502020204030204" pitchFamily="34" charset="0"/>
+                          <a:cs typeface="Times New Roman" panose="02020603050405020304" pitchFamily="18" charset="0"/>
+                        </a:rPr>
+                        <a:t>Ungenauigkeiten, Messergebnisse, Logik</a:t>
+                      </a:r>
+                      <a:endParaRPr lang="de-DE" sz="2900" b="0" i="0" u="none" strike="noStrike" dirty="0">
+                        <a:effectLst/>
+                        <a:latin typeface="Arial" panose="020B0604020202020204" pitchFamily="34" charset="0"/>
+                      </a:endParaRPr>
+                    </a:p>
+                  </a:txBody>
+                  <a:tcPr marL="108842" marR="108842" marT="15117" marB="0">
+                    <a:lnL w="12700" cap="flat" cmpd="sng" algn="ctr">
+                      <a:solidFill>
+                        <a:srgbClr val="000000"/>
+                      </a:solidFill>
+                      <a:prstDash val="solid"/>
+                      <a:round/>
+                      <a:headEnd type="none" w="med" len="med"/>
+                      <a:tailEnd type="none" w="med" len="med"/>
+                    </a:lnL>
+                    <a:lnR w="12700" cap="flat" cmpd="sng" algn="ctr">
+                      <a:solidFill>
+                        <a:srgbClr val="000000"/>
+                      </a:solidFill>
+                      <a:prstDash val="solid"/>
+                      <a:round/>
+                      <a:headEnd type="none" w="med" len="med"/>
+                      <a:tailEnd type="none" w="med" len="med"/>
+                    </a:lnR>
+                    <a:lnT w="12700" cap="flat" cmpd="sng" algn="ctr">
+                      <a:solidFill>
+                        <a:srgbClr val="000000"/>
+                      </a:solidFill>
+                      <a:prstDash val="solid"/>
+                      <a:round/>
+                      <a:headEnd type="none" w="med" len="med"/>
+                      <a:tailEnd type="none" w="med" len="med"/>
+                    </a:lnT>
+                    <a:lnB w="12700" cap="flat" cmpd="sng" algn="ctr">
+                      <a:solidFill>
+                        <a:srgbClr val="000000"/>
+                      </a:solidFill>
+                      <a:prstDash val="solid"/>
+                      <a:round/>
+                      <a:headEnd type="none" w="med" len="med"/>
+                      <a:tailEnd type="none" w="med" len="med"/>
+                    </a:lnB>
+                  </a:tcPr>
+                </a:tc>
+                <a:tc>
+                  <a:txBody>
+                    <a:bodyPr/>
+                    <a:lstStyle/>
+                    <a:p>
+                      <a:pPr algn="l" fontAlgn="t">
+                        <a:lnSpc>
+                          <a:spcPct val="107000"/>
+                        </a:lnSpc>
+                        <a:spcBef>
+                          <a:spcPts val="0"/>
+                        </a:spcBef>
+                        <a:spcAft>
+                          <a:spcPts val="800"/>
+                        </a:spcAft>
+                      </a:pPr>
+                      <a:r>
+                        <a:rPr lang="de-DE" sz="1600" b="0" i="0" u="none" strike="noStrike" dirty="0">
+                          <a:effectLst/>
+                          <a:latin typeface="Calibri" panose="020F0502020204030204" pitchFamily="34" charset="0"/>
+                          <a:ea typeface="Calibri" panose="020F0502020204030204" pitchFamily="34" charset="0"/>
+                          <a:cs typeface="Times New Roman" panose="02020603050405020304" pitchFamily="18" charset="0"/>
+                        </a:rPr>
+                        <a:t>Frühes Ausprobieren von Teilsystemen</a:t>
+                      </a:r>
+                      <a:endParaRPr lang="de-DE" sz="2900" b="0" i="0" u="none" strike="noStrike" dirty="0">
                         <a:effectLst/>
                         <a:latin typeface="Arial" panose="020B0604020202020204" pitchFamily="34" charset="0"/>
                       </a:endParaRPr>
@@ -9351,85 +10337,8 @@
                       <a:tailEnd type="none" w="med" len="med"/>
                     </a:lnB>
                     <a:solidFill>
-                      <a:srgbClr val="FF0000"/>
+                      <a:srgbClr val="FFC000"/>
                     </a:solidFill>
-                  </a:tcPr>
-                </a:tc>
-                <a:extLst>
-                  <a:ext uri="{0D108BD9-81ED-4DB2-BD59-A6C34878D82A}">
-                    <a16:rowId xmlns:a16="http://schemas.microsoft.com/office/drawing/2014/main" val="2187251753"/>
-                  </a:ext>
-                </a:extLst>
-              </a:tr>
-              <a:tr h="554536">
-                <a:tc>
-                  <a:txBody>
-                    <a:bodyPr/>
-                    <a:lstStyle/>
-                    <a:p>
-                      <a:pPr algn="l" fontAlgn="t">
-                        <a:lnSpc>
-                          <a:spcPct val="107000"/>
-                        </a:lnSpc>
-                        <a:spcBef>
-                          <a:spcPts val="0"/>
-                        </a:spcBef>
-                        <a:spcAft>
-                          <a:spcPts val="800"/>
-                        </a:spcAft>
-                      </a:pPr>
-                      <a:r>
-                        <a:rPr lang="de-DE" sz="1600" b="0" i="0" u="none" strike="noStrike">
-                          <a:effectLst/>
-                          <a:latin typeface="Calibri" panose="020F0502020204030204" pitchFamily="34" charset="0"/>
-                          <a:ea typeface="Calibri" panose="020F0502020204030204" pitchFamily="34" charset="0"/>
-                          <a:cs typeface="Times New Roman" panose="02020603050405020304" pitchFamily="18" charset="0"/>
-                        </a:rPr>
-                        <a:t>System misst falsch oder gar nicht</a:t>
-                      </a:r>
-                      <a:endParaRPr lang="de-DE" sz="2900" b="0" i="0" u="none" strike="noStrike">
-                        <a:effectLst/>
-                        <a:latin typeface="Arial" panose="020B0604020202020204" pitchFamily="34" charset="0"/>
-                      </a:endParaRPr>
-                    </a:p>
-                  </a:txBody>
-                  <a:tcPr marL="108842" marR="108842" marT="15117" marB="0">
-                    <a:lnL w="12700" cap="flat" cmpd="sng" algn="ctr">
-                      <a:solidFill>
-                        <a:srgbClr val="000000"/>
-                      </a:solidFill>
-                      <a:prstDash val="solid"/>
-                      <a:round/>
-                      <a:headEnd type="none" w="med" len="med"/>
-                      <a:tailEnd type="none" w="med" len="med"/>
-                    </a:lnL>
-                    <a:lnR w="12700" cap="flat" cmpd="sng" algn="ctr">
-                      <a:solidFill>
-                        <a:srgbClr val="000000"/>
-                      </a:solidFill>
-                      <a:prstDash val="solid"/>
-                      <a:round/>
-                      <a:headEnd type="none" w="med" len="med"/>
-                      <a:tailEnd type="none" w="med" len="med"/>
-                    </a:lnR>
-                    <a:lnT w="12700" cap="flat" cmpd="sng" algn="ctr">
-                      <a:solidFill>
-                        <a:srgbClr val="000000"/>
-                      </a:solidFill>
-                      <a:prstDash val="solid"/>
-                      <a:round/>
-                      <a:headEnd type="none" w="med" len="med"/>
-                      <a:tailEnd type="none" w="med" len="med"/>
-                    </a:lnT>
-                    <a:lnB w="12700" cap="flat" cmpd="sng" algn="ctr">
-                      <a:solidFill>
-                        <a:srgbClr val="000000"/>
-                      </a:solidFill>
-                      <a:prstDash val="solid"/>
-                      <a:round/>
-                      <a:headEnd type="none" w="med" len="med"/>
-                      <a:tailEnd type="none" w="med" len="med"/>
-                    </a:lnB>
                   </a:tcPr>
                 </a:tc>
                 <a:tc>
@@ -9449,18 +10358,16 @@
                         </a:spcAft>
                       </a:pPr>
                       <a:r>
-                        <a:rPr lang="de-DE" sz="1600" b="0" i="0" u="none" strike="noStrike" dirty="0">
+                        <a:rPr lang="de-DE" sz="1600" b="0" i="0" u="none" strike="noStrike" kern="1200" dirty="0">
+                          <a:solidFill>
+                            <a:schemeClr val="tx1"/>
+                          </a:solidFill>
                           <a:effectLst/>
                           <a:latin typeface="Calibri" panose="020F0502020204030204" pitchFamily="34" charset="0"/>
-                          <a:ea typeface="Calibri" panose="020F0502020204030204" pitchFamily="34" charset="0"/>
                           <a:cs typeface="Times New Roman" panose="02020603050405020304" pitchFamily="18" charset="0"/>
                         </a:rPr>
-                        <a:t>Ungenauigkeiten, Messergebnisse, Logik</a:t>
+                        <a:t>6</a:t>
                       </a:r>
-                      <a:endParaRPr lang="de-DE" sz="2900" b="0" i="0" u="none" strike="noStrike" dirty="0">
-                        <a:effectLst/>
-                        <a:latin typeface="Arial" panose="020B0604020202020204" pitchFamily="34" charset="0"/>
-                      </a:endParaRPr>
                     </a:p>
                   </a:txBody>
                   <a:tcPr marL="108842" marR="108842" marT="15117" marB="0">
@@ -9500,149 +10407,7 @@
                       <a:headEnd type="none" w="med" len="med"/>
                       <a:tailEnd type="none" w="med" len="med"/>
                     </a:lnB>
-                  </a:tcPr>
-                </a:tc>
-                <a:tc>
-                  <a:txBody>
-                    <a:bodyPr/>
-                    <a:lstStyle/>
-                    <a:p>
-                      <a:pPr algn="l" fontAlgn="t">
-                        <a:lnSpc>
-                          <a:spcPct val="107000"/>
-                        </a:lnSpc>
-                        <a:spcBef>
-                          <a:spcPts val="0"/>
-                        </a:spcBef>
-                        <a:spcAft>
-                          <a:spcPts val="800"/>
-                        </a:spcAft>
-                      </a:pPr>
-                      <a:r>
-                        <a:rPr lang="de-DE" sz="1600" b="0" i="0" u="none" strike="noStrike">
-                          <a:effectLst/>
-                          <a:latin typeface="Calibri" panose="020F0502020204030204" pitchFamily="34" charset="0"/>
-                          <a:ea typeface="Calibri" panose="020F0502020204030204" pitchFamily="34" charset="0"/>
-                          <a:cs typeface="Times New Roman" panose="02020603050405020304" pitchFamily="18" charset="0"/>
-                        </a:rPr>
-                        <a:t>Frühes Ausprobieren von Teilsystemen</a:t>
-                      </a:r>
-                      <a:endParaRPr lang="de-DE" sz="2900" b="0" i="0" u="none" strike="noStrike">
-                        <a:effectLst/>
-                        <a:latin typeface="Arial" panose="020B0604020202020204" pitchFamily="34" charset="0"/>
-                      </a:endParaRPr>
-                    </a:p>
-                  </a:txBody>
-                  <a:tcPr marL="108842" marR="108842" marT="15117" marB="0">
-                    <a:lnL w="12700" cap="flat" cmpd="sng" algn="ctr">
-                      <a:solidFill>
-                        <a:srgbClr val="000000"/>
-                      </a:solidFill>
-                      <a:prstDash val="solid"/>
-                      <a:round/>
-                      <a:headEnd type="none" w="med" len="med"/>
-                      <a:tailEnd type="none" w="med" len="med"/>
-                    </a:lnL>
-                    <a:lnR w="12700" cap="flat" cmpd="sng" algn="ctr">
-                      <a:solidFill>
-                        <a:srgbClr val="000000"/>
-                      </a:solidFill>
-                      <a:prstDash val="solid"/>
-                      <a:round/>
-                      <a:headEnd type="none" w="med" len="med"/>
-                      <a:tailEnd type="none" w="med" len="med"/>
-                    </a:lnR>
-                    <a:lnT w="12700" cap="flat" cmpd="sng" algn="ctr">
-                      <a:solidFill>
-                        <a:srgbClr val="000000"/>
-                      </a:solidFill>
-                      <a:prstDash val="solid"/>
-                      <a:round/>
-                      <a:headEnd type="none" w="med" len="med"/>
-                      <a:tailEnd type="none" w="med" len="med"/>
-                    </a:lnT>
-                    <a:lnB w="12700" cap="flat" cmpd="sng" algn="ctr">
-                      <a:solidFill>
-                        <a:srgbClr val="000000"/>
-                      </a:solidFill>
-                      <a:prstDash val="solid"/>
-                      <a:round/>
-                      <a:headEnd type="none" w="med" len="med"/>
-                      <a:tailEnd type="none" w="med" len="med"/>
-                    </a:lnB>
-                  </a:tcPr>
-                </a:tc>
-                <a:tc>
-                  <a:txBody>
-                    <a:bodyPr/>
-                    <a:lstStyle/>
-                    <a:p>
-                      <a:pPr algn="l" fontAlgn="t">
-                        <a:lnSpc>
-                          <a:spcPct val="107000"/>
-                        </a:lnSpc>
-                        <a:spcBef>
-                          <a:spcPts val="0"/>
-                        </a:spcBef>
-                        <a:spcAft>
-                          <a:spcPts val="800"/>
-                        </a:spcAft>
-                      </a:pPr>
-                      <a:r>
-                        <a:rPr lang="de-DE" sz="1600" b="0" i="0" u="none" strike="noStrike">
-                          <a:effectLst/>
-                          <a:latin typeface="Calibri" panose="020F0502020204030204" pitchFamily="34" charset="0"/>
-                          <a:ea typeface="Calibri" panose="020F0502020204030204" pitchFamily="34" charset="0"/>
-                          <a:cs typeface="Times New Roman" panose="02020603050405020304" pitchFamily="18" charset="0"/>
-                        </a:rPr>
-                        <a:t> </a:t>
-                      </a:r>
-                      <a:endParaRPr lang="de-DE" sz="2900" b="0" i="0" u="none" strike="noStrike">
-                        <a:effectLst/>
-                        <a:latin typeface="Arial" panose="020B0604020202020204" pitchFamily="34" charset="0"/>
-                      </a:endParaRPr>
-                    </a:p>
-                  </a:txBody>
-                  <a:tcPr marL="108842" marR="108842" marT="15117" marB="0">
-                    <a:lnL w="12700" cap="flat" cmpd="sng" algn="ctr">
-                      <a:solidFill>
-                        <a:srgbClr val="000000"/>
-                      </a:solidFill>
-                      <a:prstDash val="solid"/>
-                      <a:round/>
-                      <a:headEnd type="none" w="med" len="med"/>
-                      <a:tailEnd type="none" w="med" len="med"/>
-                    </a:lnL>
-                    <a:lnR w="12700" cap="flat" cmpd="sng" algn="ctr">
-                      <a:solidFill>
-                        <a:srgbClr val="000000"/>
-                      </a:solidFill>
-                      <a:prstDash val="solid"/>
-                      <a:round/>
-                      <a:headEnd type="none" w="med" len="med"/>
-                      <a:tailEnd type="none" w="med" len="med"/>
-                    </a:lnR>
-                    <a:lnT w="12700" cap="flat" cmpd="sng" algn="ctr">
-                      <a:solidFill>
-                        <a:srgbClr val="000000"/>
-                      </a:solidFill>
-                      <a:prstDash val="solid"/>
-                      <a:round/>
-                      <a:headEnd type="none" w="med" len="med"/>
-                      <a:tailEnd type="none" w="med" len="med"/>
-                    </a:lnT>
-                    <a:lnB w="12700" cap="flat" cmpd="sng" algn="ctr">
-                      <a:solidFill>
-                        <a:srgbClr val="000000"/>
-                      </a:solidFill>
-                      <a:prstDash val="solid"/>
-                      <a:round/>
-                      <a:headEnd type="none" w="med" len="med"/>
-                      <a:tailEnd type="none" w="med" len="med"/>
-                    </a:lnB>
-                    <a:solidFill>
-                      <a:srgbClr val="FFC000"/>
-                    </a:solidFill>
+                    <a:noFill/>
                   </a:tcPr>
                 </a:tc>
                 <a:extLst>
@@ -9935,6 +10700,75 @@
                     </a:solidFill>
                   </a:tcPr>
                 </a:tc>
+                <a:tc>
+                  <a:txBody>
+                    <a:bodyPr/>
+                    <a:lstStyle/>
+                    <a:p>
+                      <a:pPr algn="l" fontAlgn="t">
+                        <a:lnSpc>
+                          <a:spcPct val="107000"/>
+                        </a:lnSpc>
+                        <a:spcBef>
+                          <a:spcPts val="0"/>
+                        </a:spcBef>
+                        <a:spcAft>
+                          <a:spcPts val="800"/>
+                        </a:spcAft>
+                      </a:pPr>
+                      <a:r>
+                        <a:rPr lang="de-DE" sz="1600" b="0" i="0" u="none" strike="noStrike" kern="1200" dirty="0">
+                          <a:solidFill>
+                            <a:schemeClr val="tx1"/>
+                          </a:solidFill>
+                          <a:effectLst/>
+                          <a:latin typeface="Calibri" panose="020F0502020204030204" pitchFamily="34" charset="0"/>
+                          <a:cs typeface="Times New Roman" panose="02020603050405020304" pitchFamily="18" charset="0"/>
+                        </a:rPr>
+                        <a:t>4</a:t>
+                      </a:r>
+                    </a:p>
+                  </a:txBody>
+                  <a:tcPr marL="108842" marR="108842" marT="15117" marB="0">
+                    <a:lnL w="12700" cap="flat" cmpd="sng" algn="ctr">
+                      <a:solidFill>
+                        <a:srgbClr val="000000"/>
+                      </a:solidFill>
+                      <a:prstDash val="solid"/>
+                      <a:round/>
+                      <a:headEnd type="none" w="med" len="med"/>
+                      <a:tailEnd type="none" w="med" len="med"/>
+                    </a:lnL>
+                    <a:lnR w="12700" cap="flat" cmpd="sng" algn="ctr">
+                      <a:solidFill>
+                        <a:srgbClr val="000000"/>
+                      </a:solidFill>
+                      <a:prstDash val="solid"/>
+                      <a:round/>
+                      <a:headEnd type="none" w="med" len="med"/>
+                      <a:tailEnd type="none" w="med" len="med"/>
+                    </a:lnR>
+                    <a:lnT w="12700" cap="flat" cmpd="sng" algn="ctr">
+                      <a:solidFill>
+                        <a:srgbClr val="000000"/>
+                      </a:solidFill>
+                      <a:prstDash val="solid"/>
+                      <a:round/>
+                      <a:headEnd type="none" w="med" len="med"/>
+                      <a:tailEnd type="none" w="med" len="med"/>
+                    </a:lnT>
+                    <a:lnB w="12700" cap="flat" cmpd="sng" algn="ctr">
+                      <a:solidFill>
+                        <a:srgbClr val="000000"/>
+                      </a:solidFill>
+                      <a:prstDash val="solid"/>
+                      <a:round/>
+                      <a:headEnd type="none" w="med" len="med"/>
+                      <a:tailEnd type="none" w="med" len="med"/>
+                    </a:lnB>
+                    <a:noFill/>
+                  </a:tcPr>
+                </a:tc>
                 <a:extLst>
                   <a:ext uri="{0D108BD9-81ED-4DB2-BD59-A6C34878D82A}">
                     <a16:rowId xmlns:a16="http://schemas.microsoft.com/office/drawing/2014/main" val="4247356537"/>
@@ -10223,6 +11057,75 @@
                     <a:solidFill>
                       <a:srgbClr val="FFFF00"/>
                     </a:solidFill>
+                  </a:tcPr>
+                </a:tc>
+                <a:tc>
+                  <a:txBody>
+                    <a:bodyPr/>
+                    <a:lstStyle/>
+                    <a:p>
+                      <a:pPr algn="l" fontAlgn="t">
+                        <a:lnSpc>
+                          <a:spcPct val="107000"/>
+                        </a:lnSpc>
+                        <a:spcBef>
+                          <a:spcPts val="0"/>
+                        </a:spcBef>
+                        <a:spcAft>
+                          <a:spcPts val="800"/>
+                        </a:spcAft>
+                      </a:pPr>
+                      <a:r>
+                        <a:rPr lang="de-DE" sz="1600" b="0" i="0" u="none" strike="noStrike" kern="1200" dirty="0">
+                          <a:solidFill>
+                            <a:schemeClr val="tx1"/>
+                          </a:solidFill>
+                          <a:effectLst/>
+                          <a:latin typeface="Calibri" panose="020F0502020204030204" pitchFamily="34" charset="0"/>
+                          <a:cs typeface="Times New Roman" panose="02020603050405020304" pitchFamily="18" charset="0"/>
+                        </a:rPr>
+                        <a:t>4</a:t>
+                      </a:r>
+                    </a:p>
+                  </a:txBody>
+                  <a:tcPr marL="108842" marR="108842" marT="15117" marB="0">
+                    <a:lnL w="12700" cap="flat" cmpd="sng" algn="ctr">
+                      <a:solidFill>
+                        <a:srgbClr val="000000"/>
+                      </a:solidFill>
+                      <a:prstDash val="solid"/>
+                      <a:round/>
+                      <a:headEnd type="none" w="med" len="med"/>
+                      <a:tailEnd type="none" w="med" len="med"/>
+                    </a:lnL>
+                    <a:lnR w="12700" cap="flat" cmpd="sng" algn="ctr">
+                      <a:solidFill>
+                        <a:srgbClr val="000000"/>
+                      </a:solidFill>
+                      <a:prstDash val="solid"/>
+                      <a:round/>
+                      <a:headEnd type="none" w="med" len="med"/>
+                      <a:tailEnd type="none" w="med" len="med"/>
+                    </a:lnR>
+                    <a:lnT w="12700" cap="flat" cmpd="sng" algn="ctr">
+                      <a:solidFill>
+                        <a:srgbClr val="000000"/>
+                      </a:solidFill>
+                      <a:prstDash val="solid"/>
+                      <a:round/>
+                      <a:headEnd type="none" w="med" len="med"/>
+                      <a:tailEnd type="none" w="med" len="med"/>
+                    </a:lnT>
+                    <a:lnB w="12700" cap="flat" cmpd="sng" algn="ctr">
+                      <a:solidFill>
+                        <a:srgbClr val="000000"/>
+                      </a:solidFill>
+                      <a:prstDash val="solid"/>
+                      <a:round/>
+                      <a:headEnd type="none" w="med" len="med"/>
+                      <a:tailEnd type="none" w="med" len="med"/>
+                    </a:lnB>
+                    <a:noFill/>
                   </a:tcPr>
                 </a:tc>
                 <a:extLst>
@@ -10519,6 +11422,78 @@
                     <a:solidFill>
                       <a:srgbClr val="00B050"/>
                     </a:solidFill>
+                  </a:tcPr>
+                </a:tc>
+                <a:tc>
+                  <a:txBody>
+                    <a:bodyPr/>
+                    <a:lstStyle/>
+                    <a:p>
+                      <a:pPr algn="l" fontAlgn="t">
+                        <a:lnSpc>
+                          <a:spcPct val="107000"/>
+                        </a:lnSpc>
+                        <a:spcBef>
+                          <a:spcPts val="0"/>
+                        </a:spcBef>
+                        <a:spcAft>
+                          <a:spcPts val="800"/>
+                        </a:spcAft>
+                        <a:tabLst>
+                          <a:tab pos="374650" algn="l"/>
+                        </a:tabLst>
+                      </a:pPr>
+                      <a:r>
+                        <a:rPr lang="de-DE" sz="1600" b="0" i="0" u="none" strike="noStrike" kern="1200" dirty="0">
+                          <a:solidFill>
+                            <a:schemeClr val="tx1"/>
+                          </a:solidFill>
+                          <a:effectLst/>
+                          <a:latin typeface="Calibri" panose="020F0502020204030204" pitchFamily="34" charset="0"/>
+                          <a:cs typeface="Times New Roman" panose="02020603050405020304" pitchFamily="18" charset="0"/>
+                        </a:rPr>
+                        <a:t>2</a:t>
+                      </a:r>
+                    </a:p>
+                  </a:txBody>
+                  <a:tcPr marL="108842" marR="108842" marT="15117" marB="0">
+                    <a:lnL w="12700" cap="flat" cmpd="sng" algn="ctr">
+                      <a:solidFill>
+                        <a:srgbClr val="000000"/>
+                      </a:solidFill>
+                      <a:prstDash val="solid"/>
+                      <a:round/>
+                      <a:headEnd type="none" w="med" len="med"/>
+                      <a:tailEnd type="none" w="med" len="med"/>
+                    </a:lnL>
+                    <a:lnR w="12700" cap="flat" cmpd="sng" algn="ctr">
+                      <a:solidFill>
+                        <a:srgbClr val="000000"/>
+                      </a:solidFill>
+                      <a:prstDash val="solid"/>
+                      <a:round/>
+                      <a:headEnd type="none" w="med" len="med"/>
+                      <a:tailEnd type="none" w="med" len="med"/>
+                    </a:lnR>
+                    <a:lnT w="12700" cap="flat" cmpd="sng" algn="ctr">
+                      <a:solidFill>
+                        <a:srgbClr val="000000"/>
+                      </a:solidFill>
+                      <a:prstDash val="solid"/>
+                      <a:round/>
+                      <a:headEnd type="none" w="med" len="med"/>
+                      <a:tailEnd type="none" w="med" len="med"/>
+                    </a:lnT>
+                    <a:lnB w="12700" cap="flat" cmpd="sng" algn="ctr">
+                      <a:solidFill>
+                        <a:srgbClr val="000000"/>
+                      </a:solidFill>
+                      <a:prstDash val="solid"/>
+                      <a:round/>
+                      <a:headEnd type="none" w="med" len="med"/>
+                      <a:tailEnd type="none" w="med" len="med"/>
+                    </a:lnB>
+                    <a:noFill/>
                   </a:tcPr>
                 </a:tc>
                 <a:extLst>

</xml_diff>